<commit_message>
Presentation wildfly version 2
</commit_message>
<xml_diff>
--- a/Presentation wildfly.pptx
+++ b/Presentation wildfly.pptx
@@ -5,10 +5,10 @@
     <p:sldMasterId id="2147484141" r:id="rId1"/>
   </p:sldMasterIdLst>
   <p:notesMasterIdLst>
-    <p:notesMasterId r:id="rId13"/>
+    <p:notesMasterId r:id="rId14"/>
   </p:notesMasterIdLst>
   <p:handoutMasterIdLst>
-    <p:handoutMasterId r:id="rId14"/>
+    <p:handoutMasterId r:id="rId15"/>
   </p:handoutMasterIdLst>
   <p:sldIdLst>
     <p:sldId id="274" r:id="rId2"/>
@@ -22,6 +22,7 @@
     <p:sldId id="307" r:id="rId10"/>
     <p:sldId id="308" r:id="rId11"/>
     <p:sldId id="309" r:id="rId12"/>
+    <p:sldId id="312" r:id="rId13"/>
   </p:sldIdLst>
   <p:sldSz cx="9144000" cy="6858000" type="screen4x3"/>
   <p:notesSz cx="6858000" cy="9144000"/>
@@ -212,7 +213,7 @@
             <a:fld id="{BBD50C84-7995-4141-8C80-BD0923B98C87}" type="datetimeFigureOut">
               <a:rPr lang="fr-FR" smtClean="0"/>
               <a:pPr/>
-              <a:t>26/03/2016</a:t>
+              <a:t>27/03/2016</a:t>
             </a:fld>
             <a:endParaRPr lang="fr-FR" dirty="0"/>
           </a:p>
@@ -380,7 +381,7 @@
             <a:fld id="{7EA85DF2-79F7-42E6-887D-8B83702526F6}" type="datetimeFigureOut">
               <a:rPr lang="fr-FR" smtClean="0"/>
               <a:pPr/>
-              <a:t>26/03/2016</a:t>
+              <a:t>27/03/2016</a:t>
             </a:fld>
             <a:endParaRPr lang="fr-FR" dirty="0"/>
           </a:p>
@@ -1025,7 +1026,7 @@
             <a:fld id="{6E94641B-9268-4C67-BC60-6ACCF4A40EFD}" type="datetime1">
               <a:rPr lang="en-US" smtClean="0"/>
               <a:pPr/>
-              <a:t>3/26/2016</a:t>
+              <a:t>3/27/2016</a:t>
             </a:fld>
             <a:endParaRPr lang="en-US" dirty="0"/>
           </a:p>
@@ -1204,7 +1205,7 @@
             <a:fld id="{9977F712-9BA1-4A42-8F59-9ACE0CF2DC8F}" type="datetime1">
               <a:rPr lang="en-US" smtClean="0"/>
               <a:pPr/>
-              <a:t>3/26/2016</a:t>
+              <a:t>3/27/2016</a:t>
             </a:fld>
             <a:endParaRPr lang="en-US" dirty="0"/>
           </a:p>
@@ -1393,7 +1394,7 @@
             <a:fld id="{ABC2A5CA-5217-4786-92B7-034717829193}" type="datetime1">
               <a:rPr lang="en-US" smtClean="0"/>
               <a:pPr/>
-              <a:t>3/26/2016</a:t>
+              <a:t>3/27/2016</a:t>
             </a:fld>
             <a:endParaRPr lang="en-US" dirty="0"/>
           </a:p>
@@ -1554,7 +1555,7 @@
             <a:fld id="{F365AC28-58B8-49ED-99F8-BB0379B19E78}" type="datetime1">
               <a:rPr lang="en-US" smtClean="0"/>
               <a:pPr/>
-              <a:t>3/26/2016</a:t>
+              <a:t>3/27/2016</a:t>
             </a:fld>
             <a:endParaRPr lang="en-US" dirty="0"/>
           </a:p>
@@ -1685,7 +1686,7 @@
             <a:fld id="{D092ED61-0808-414B-941E-4426C51EFA23}" type="datetime1">
               <a:rPr lang="en-US" smtClean="0"/>
               <a:pPr/>
-              <a:t>3/26/2016</a:t>
+              <a:t>3/27/2016</a:t>
             </a:fld>
             <a:endParaRPr lang="en-US" dirty="0"/>
           </a:p>
@@ -1969,7 +1970,7 @@
             <a:fld id="{797C5EBF-8ACD-4559-9325-DABF09FD913B}" type="datetime1">
               <a:rPr lang="en-US" smtClean="0"/>
               <a:pPr/>
-              <a:t>3/26/2016</a:t>
+              <a:t>3/27/2016</a:t>
             </a:fld>
             <a:endParaRPr lang="en-US" dirty="0"/>
           </a:p>
@@ -2257,7 +2258,7 @@
             <a:fld id="{C307A0FA-BA80-41EF-9AC7-12790775F3A7}" type="datetime1">
               <a:rPr lang="en-US" smtClean="0"/>
               <a:pPr/>
-              <a:t>3/26/2016</a:t>
+              <a:t>3/27/2016</a:t>
             </a:fld>
             <a:endParaRPr lang="en-US" dirty="0"/>
           </a:p>
@@ -2713,7 +2714,7 @@
             <a:fld id="{E988777C-CB92-449D-ADD4-881A946C0AD1}" type="datetime1">
               <a:rPr lang="en-US" smtClean="0"/>
               <a:pPr/>
-              <a:t>3/26/2016</a:t>
+              <a:t>3/27/2016</a:t>
             </a:fld>
             <a:endParaRPr lang="en-US" dirty="0"/>
           </a:p>
@@ -2840,7 +2841,7 @@
             <a:fld id="{3FDC07EF-EEC8-4972-AC77-B2FAA32E2150}" type="datetime1">
               <a:rPr lang="en-US" smtClean="0"/>
               <a:pPr/>
-              <a:t>3/26/2016</a:t>
+              <a:t>3/27/2016</a:t>
             </a:fld>
             <a:endParaRPr lang="en-US" dirty="0"/>
           </a:p>
@@ -3104,7 +3105,7 @@
             <a:fld id="{7D64D922-8548-43B4-AEE4-DE7450BFCD21}" type="datetime1">
               <a:rPr lang="en-US" smtClean="0"/>
               <a:pPr/>
-              <a:t>3/26/2016</a:t>
+              <a:t>3/27/2016</a:t>
             </a:fld>
             <a:endParaRPr lang="en-US" dirty="0"/>
           </a:p>
@@ -3358,7 +3359,7 @@
             <a:fld id="{220AF8C6-63B7-4ABC-A607-521C9C34676D}" type="datetime1">
               <a:rPr lang="en-US" smtClean="0"/>
               <a:pPr/>
-              <a:t>3/26/2016</a:t>
+              <a:t>3/27/2016</a:t>
             </a:fld>
             <a:endParaRPr lang="en-US" dirty="0"/>
           </a:p>
@@ -3551,7 +3552,7 @@
             <a:fld id="{E69AEE0B-8BB9-462B-8958-2209086EAC34}" type="datetime1">
               <a:rPr lang="en-US" smtClean="0"/>
               <a:pPr/>
-              <a:t>3/26/2016</a:t>
+              <a:t>3/27/2016</a:t>
             </a:fld>
             <a:endParaRPr lang="en-US" dirty="0">
               <a:solidFill>
@@ -5731,53 +5732,6 @@
               </a:rPr>
               <a:t>Tomcat?</a:t>
             </a:r>
-            <a:endParaRPr lang="fr-FR" sz="3500" b="1" dirty="0" smtClean="0">
-              <a:ln w="11430"/>
-              <a:gradFill>
-                <a:gsLst>
-                  <a:gs pos="0">
-                    <a:schemeClr val="accent6">
-                      <a:tint val="90000"/>
-                      <a:satMod val="120000"/>
-                    </a:schemeClr>
-                  </a:gs>
-                  <a:gs pos="25000">
-                    <a:schemeClr val="accent6">
-                      <a:tint val="93000"/>
-                      <a:satMod val="120000"/>
-                    </a:schemeClr>
-                  </a:gs>
-                  <a:gs pos="50000">
-                    <a:schemeClr val="accent6">
-                      <a:shade val="89000"/>
-                      <a:satMod val="110000"/>
-                    </a:schemeClr>
-                  </a:gs>
-                  <a:gs pos="75000">
-                    <a:schemeClr val="accent6">
-                      <a:tint val="93000"/>
-                      <a:satMod val="120000"/>
-                    </a:schemeClr>
-                  </a:gs>
-                  <a:gs pos="100000">
-                    <a:schemeClr val="accent6">
-                      <a:tint val="90000"/>
-                      <a:satMod val="120000"/>
-                    </a:schemeClr>
-                  </a:gs>
-                </a:gsLst>
-                <a:lin ang="5400000"/>
-              </a:gradFill>
-              <a:effectLst>
-                <a:outerShdw blurRad="80000" dist="40000" dir="5040000" algn="tl">
-                  <a:srgbClr val="000000">
-                    <a:alpha val="30000"/>
-                  </a:srgbClr>
-                </a:outerShdw>
-              </a:effectLst>
-              <a:latin typeface="Times New Roman" pitchFamily="18" charset="0"/>
-              <a:cs typeface="Times New Roman" pitchFamily="18" charset="0"/>
-            </a:endParaRPr>
           </a:p>
         </p:txBody>
       </p:sp>
@@ -6087,8 +6041,8 @@
   <p:clrMapOvr>
     <a:masterClrMapping/>
   </p:clrMapOvr>
-  <mc:AlternateContent xmlns:mc="http://schemas.openxmlformats.org/markup-compatibility/2006">
-    <mc:Choice xmlns:p14="http://schemas.microsoft.com/office/powerpoint/2010/main" Requires="p14">
+  <mc:AlternateContent xmlns:mc="http://schemas.openxmlformats.org/markup-compatibility/2006" xmlns:p14="http://schemas.microsoft.com/office/powerpoint/2010/main">
+    <mc:Choice Requires="p14">
       <p:transition spd="med" p14:dur="700">
         <p:fade/>
         <p:sndAc>
@@ -6098,12 +6052,12 @@
         </p:sndAc>
       </p:transition>
     </mc:Choice>
-    <mc:Fallback>
+    <mc:Fallback xmlns="">
       <p:transition spd="med">
         <p:fade/>
         <p:sndAc>
           <p:stSnd>
-            <p:snd r:embed="rId2" name="click.wav"/>
+            <p:snd r:embed="rId6" name="click.wav"/>
           </p:stSnd>
         </p:sndAc>
       </p:transition>
@@ -6717,53 +6671,6 @@
               </a:rPr>
               <a:t>Conclure</a:t>
             </a:r>
-            <a:endParaRPr lang="fr-FR" sz="3500" b="1" dirty="0" smtClean="0">
-              <a:ln w="11430"/>
-              <a:gradFill>
-                <a:gsLst>
-                  <a:gs pos="0">
-                    <a:schemeClr val="accent6">
-                      <a:tint val="90000"/>
-                      <a:satMod val="120000"/>
-                    </a:schemeClr>
-                  </a:gs>
-                  <a:gs pos="25000">
-                    <a:schemeClr val="accent6">
-                      <a:tint val="93000"/>
-                      <a:satMod val="120000"/>
-                    </a:schemeClr>
-                  </a:gs>
-                  <a:gs pos="50000">
-                    <a:schemeClr val="accent6">
-                      <a:shade val="89000"/>
-                      <a:satMod val="110000"/>
-                    </a:schemeClr>
-                  </a:gs>
-                  <a:gs pos="75000">
-                    <a:schemeClr val="accent6">
-                      <a:tint val="93000"/>
-                      <a:satMod val="120000"/>
-                    </a:schemeClr>
-                  </a:gs>
-                  <a:gs pos="100000">
-                    <a:schemeClr val="accent6">
-                      <a:tint val="90000"/>
-                      <a:satMod val="120000"/>
-                    </a:schemeClr>
-                  </a:gs>
-                </a:gsLst>
-                <a:lin ang="5400000"/>
-              </a:gradFill>
-              <a:effectLst>
-                <a:outerShdw blurRad="80000" dist="40000" dir="5040000" algn="tl">
-                  <a:srgbClr val="000000">
-                    <a:alpha val="30000"/>
-                  </a:srgbClr>
-                </a:outerShdw>
-              </a:effectLst>
-              <a:latin typeface="Times New Roman" pitchFamily="18" charset="0"/>
-              <a:cs typeface="Times New Roman" pitchFamily="18" charset="0"/>
-            </a:endParaRPr>
           </a:p>
         </p:txBody>
       </p:sp>
@@ -6970,8 +6877,8 @@
   <p:clrMapOvr>
     <a:masterClrMapping/>
   </p:clrMapOvr>
-  <mc:AlternateContent xmlns:mc="http://schemas.openxmlformats.org/markup-compatibility/2006">
-    <mc:Choice xmlns:p14="http://schemas.microsoft.com/office/powerpoint/2010/main" Requires="p14">
+  <mc:AlternateContent xmlns:mc="http://schemas.openxmlformats.org/markup-compatibility/2006" xmlns:p14="http://schemas.microsoft.com/office/powerpoint/2010/main">
+    <mc:Choice Requires="p14">
       <p:transition spd="med" p14:dur="700">
         <p:fade/>
         <p:sndAc>
@@ -6981,12 +6888,12 @@
         </p:sndAc>
       </p:transition>
     </mc:Choice>
-    <mc:Fallback>
+    <mc:Fallback xmlns="">
       <p:transition spd="med">
         <p:fade/>
         <p:sndAc>
           <p:stSnd>
-            <p:snd r:embed="rId2" name="click.wav"/>
+            <p:snd r:embed="rId6" name="click.wav"/>
           </p:stSnd>
         </p:sndAc>
       </p:transition>
@@ -7002,7 +6909,7 @@
 </p:sld>
 </file>
 
-<file path=ppt/slides/slide2.xml><?xml version="1.0" encoding="utf-8"?>
+<file path=ppt/slides/slide12.xml><?xml version="1.0" encoding="utf-8"?>
 <p:sld xmlns:a="http://schemas.openxmlformats.org/drawingml/2006/main" xmlns:r="http://schemas.openxmlformats.org/officeDocument/2006/relationships" xmlns:p="http://schemas.openxmlformats.org/presentationml/2006/main">
   <p:cSld>
     <p:spTree>
@@ -7027,8 +6934,8 @@
         </p:nvSpPr>
         <p:spPr>
           <a:xfrm flipH="1">
-            <a:off x="71406" y="142852"/>
-            <a:ext cx="714380" cy="779324"/>
+            <a:off x="71438" y="142852"/>
+            <a:ext cx="714348" cy="779324"/>
           </a:xfrm>
           <a:prstGeom prst="cube">
             <a:avLst/>
@@ -7094,126 +7001,7 @@
       </p:sp>
       <p:sp>
         <p:nvSpPr>
-          <p:cNvPr id="5" name="Cube 4"/>
-          <p:cNvSpPr/>
-          <p:nvPr/>
-        </p:nvSpPr>
-        <p:spPr>
-          <a:xfrm flipH="1">
-            <a:off x="714348" y="357166"/>
-            <a:ext cx="642942" cy="714380"/>
-          </a:xfrm>
-          <a:prstGeom prst="cube">
-            <a:avLst/>
-          </a:prstGeom>
-          <a:gradFill flip="none" rotWithShape="1">
-            <a:gsLst>
-              <a:gs pos="0">
-                <a:srgbClr val="FFFFFF"/>
-              </a:gs>
-              <a:gs pos="7001">
-                <a:srgbClr val="E6E6E6"/>
-              </a:gs>
-              <a:gs pos="32001">
-                <a:srgbClr val="7D8496"/>
-              </a:gs>
-              <a:gs pos="47000">
-                <a:srgbClr val="E6E6E6"/>
-              </a:gs>
-              <a:gs pos="85001">
-                <a:srgbClr val="7D8496"/>
-              </a:gs>
-              <a:gs pos="100000">
-                <a:srgbClr val="E6E6E6"/>
-              </a:gs>
-            </a:gsLst>
-            <a:lin ang="13500000" scaled="0"/>
-            <a:tileRect/>
-          </a:gradFill>
-          <a:effectLst>
-            <a:outerShdw blurRad="76200" dist="12700" dir="2700000" sy="-23000" kx="-800400" algn="bl" rotWithShape="0">
-              <a:prstClr val="black">
-                <a:alpha val="20000"/>
-              </a:prstClr>
-            </a:outerShdw>
-          </a:effectLst>
-          <a:scene3d>
-            <a:camera prst="isometricOffAxis1Right"/>
-            <a:lightRig rig="threePt" dir="t"/>
-          </a:scene3d>
-        </p:spPr>
-        <p:style>
-          <a:lnRef idx="1">
-            <a:schemeClr val="accent6"/>
-          </a:lnRef>
-          <a:fillRef idx="2">
-            <a:schemeClr val="accent6"/>
-          </a:fillRef>
-          <a:effectRef idx="1">
-            <a:schemeClr val="accent6"/>
-          </a:effectRef>
-          <a:fontRef idx="minor">
-            <a:schemeClr val="dk1"/>
-          </a:fontRef>
-        </p:style>
-        <p:txBody>
-          <a:bodyPr rtlCol="0" anchor="ctr"/>
-          <a:lstStyle/>
-          <a:p>
-            <a:pPr algn="ctr"/>
-            <a:endParaRPr lang="fr-FR" dirty="0"/>
-          </a:p>
-        </p:txBody>
-      </p:sp>
-      <p:pic>
-        <p:nvPicPr>
-          <p:cNvPr id="6" name="Picture 5" descr="ISAE.png"/>
-          <p:cNvPicPr>
-            <a:picLocks noChangeAspect="1"/>
-          </p:cNvPicPr>
-          <p:nvPr/>
-        </p:nvPicPr>
-        <p:blipFill>
-          <a:blip r:embed="rId3"/>
-          <a:stretch>
-            <a:fillRect/>
-          </a:stretch>
-        </p:blipFill>
-        <p:spPr>
-          <a:xfrm>
-            <a:off x="967628" y="571480"/>
-            <a:ext cx="389662" cy="389662"/>
-          </a:xfrm>
-          <a:prstGeom prst="roundRect">
-            <a:avLst>
-              <a:gd name="adj" fmla="val 16667"/>
-            </a:avLst>
-          </a:prstGeom>
-          <a:ln>
-            <a:noFill/>
-          </a:ln>
-          <a:effectLst>
-            <a:outerShdw blurRad="76200" dir="18900000" sy="23000" kx="-1200000" algn="bl" rotWithShape="0">
-              <a:prstClr val="black">
-                <a:alpha val="20000"/>
-              </a:prstClr>
-            </a:outerShdw>
-          </a:effectLst>
-          <a:scene3d>
-            <a:camera prst="isometricOffAxis1Right"/>
-            <a:lightRig rig="threePt" dir="t"/>
-          </a:scene3d>
-          <a:sp3d contourW="6350" prstMaterial="matte">
-            <a:bevelT w="101600" h="101600"/>
-            <a:contourClr>
-              <a:srgbClr val="969696"/>
-            </a:contourClr>
-          </a:sp3d>
-        </p:spPr>
-      </p:pic>
-      <p:sp>
-        <p:nvSpPr>
-          <p:cNvPr id="7" name="Half Frame 6"/>
+          <p:cNvPr id="5" name="Half Frame 4"/>
           <p:cNvSpPr/>
           <p:nvPr/>
         </p:nvSpPr>
@@ -7288,7 +7076,7 @@
       </p:sp>
       <p:sp>
         <p:nvSpPr>
-          <p:cNvPr id="8" name="Half Frame 7"/>
+          <p:cNvPr id="6" name="Half Frame 5"/>
           <p:cNvSpPr/>
           <p:nvPr/>
         </p:nvSpPr>
@@ -7363,7 +7151,7 @@
       </p:sp>
       <p:sp>
         <p:nvSpPr>
-          <p:cNvPr id="9" name="Rectangle 8"/>
+          <p:cNvPr id="7" name="Rectangle 6"/>
           <p:cNvSpPr/>
           <p:nvPr/>
         </p:nvSpPr>
@@ -7414,7 +7202,7 @@
       </p:sp>
       <p:sp>
         <p:nvSpPr>
-          <p:cNvPr id="10" name="Rectangle 9"/>
+          <p:cNvPr id="8" name="Rectangle 7"/>
           <p:cNvSpPr/>
           <p:nvPr/>
         </p:nvSpPr>
@@ -7465,14 +7253,14 @@
       </p:sp>
       <p:sp>
         <p:nvSpPr>
-          <p:cNvPr id="11" name="Rectangle 10"/>
+          <p:cNvPr id="10" name="Rectangle 9"/>
           <p:cNvSpPr/>
           <p:nvPr/>
         </p:nvSpPr>
         <p:spPr>
           <a:xfrm>
-            <a:off x="1071538" y="428604"/>
-            <a:ext cx="7929618" cy="630942"/>
+            <a:off x="464315" y="2921372"/>
+            <a:ext cx="8072494" cy="630942"/>
           </a:xfrm>
           <a:prstGeom prst="rect">
             <a:avLst/>
@@ -7502,53 +7290,42 @@
             <a:pPr algn="ctr"/>
             <a:r>
               <a:rPr lang="fr-FR" sz="3500" b="1" dirty="0" smtClean="0">
-                <a:ln w="11430"/>
+                <a:ln w="1905"/>
                 <a:gradFill>
                   <a:gsLst>
                     <a:gs pos="0">
                       <a:schemeClr val="accent6">
-                        <a:tint val="90000"/>
-                        <a:satMod val="120000"/>
+                        <a:shade val="20000"/>
+                        <a:satMod val="200000"/>
                       </a:schemeClr>
                     </a:gs>
-                    <a:gs pos="25000">
+                    <a:gs pos="78000">
                       <a:schemeClr val="accent6">
-                        <a:tint val="93000"/>
-                        <a:satMod val="120000"/>
-                      </a:schemeClr>
-                    </a:gs>
-                    <a:gs pos="50000">
-                      <a:schemeClr val="accent6">
+                        <a:tint val="90000"/>
                         <a:shade val="89000"/>
-                        <a:satMod val="110000"/>
-                      </a:schemeClr>
-                    </a:gs>
-                    <a:gs pos="75000">
-                      <a:schemeClr val="accent6">
-                        <a:tint val="93000"/>
-                        <a:satMod val="120000"/>
+                        <a:satMod val="220000"/>
                       </a:schemeClr>
                     </a:gs>
                     <a:gs pos="100000">
                       <a:schemeClr val="accent6">
-                        <a:tint val="90000"/>
-                        <a:satMod val="120000"/>
+                        <a:tint val="12000"/>
+                        <a:satMod val="255000"/>
                       </a:schemeClr>
                     </a:gs>
                   </a:gsLst>
                   <a:lin ang="5400000"/>
                 </a:gradFill>
                 <a:effectLst>
-                  <a:outerShdw blurRad="80000" dist="40000" dir="5040000" algn="tl">
+                  <a:innerShdw blurRad="69850" dist="43180" dir="5400000">
                     <a:srgbClr val="000000">
-                      <a:alpha val="30000"/>
+                      <a:alpha val="65000"/>
                     </a:srgbClr>
-                  </a:outerShdw>
+                  </a:innerShdw>
                 </a:effectLst>
                 <a:latin typeface="Times New Roman" pitchFamily="18" charset="0"/>
                 <a:cs typeface="Times New Roman" pitchFamily="18" charset="0"/>
               </a:rPr>
-              <a:t>Plan du Présentation</a:t>
+              <a:t>Merci pour votre temps</a:t>
             </a:r>
             <a:endParaRPr lang="fr-FR" sz="3500" b="1" dirty="0">
               <a:ln w="11430"/>
@@ -7602,47 +7379,14 @@
       </p:sp>
       <p:pic>
         <p:nvPicPr>
-          <p:cNvPr id="12" name="Picture 11" descr="C:\Program Files\Microsoft Office\MEDIA\OFFICE11\Lines\BD21338_.gif"/>
-          <p:cNvPicPr/>
-          <p:nvPr/>
-        </p:nvPicPr>
-        <p:blipFill>
-          <a:blip r:embed="rId4"/>
-          <a:srcRect/>
-          <a:stretch>
-            <a:fillRect/>
-          </a:stretch>
-        </p:blipFill>
-        <p:spPr bwMode="auto">
-          <a:xfrm>
-            <a:off x="1393009" y="1000108"/>
-            <a:ext cx="7286676" cy="71438"/>
-          </a:xfrm>
-          <a:prstGeom prst="rect">
-            <a:avLst/>
-          </a:prstGeom>
-          <a:ln>
-            <a:noFill/>
-          </a:ln>
-          <a:effectLst>
-            <a:outerShdw blurRad="292100" dist="139700" dir="2700000" algn="tl" rotWithShape="0">
-              <a:srgbClr val="333333">
-                <a:alpha val="65000"/>
-              </a:srgbClr>
-            </a:outerShdw>
-          </a:effectLst>
-        </p:spPr>
-      </p:pic>
-      <p:pic>
-        <p:nvPicPr>
-          <p:cNvPr id="13" name="Picture 12" descr="cnam.png"/>
+          <p:cNvPr id="12" name="Picture 11" descr="cnam.png"/>
           <p:cNvPicPr>
             <a:picLocks noChangeAspect="1"/>
           </p:cNvPicPr>
           <p:nvPr/>
         </p:nvPicPr>
         <p:blipFill>
-          <a:blip r:embed="rId5"/>
+          <a:blip r:embed="rId3"/>
           <a:stretch>
             <a:fillRect/>
           </a:stretch>
@@ -7683,6 +7427,891 @@
       </p:pic>
       <p:sp>
         <p:nvSpPr>
+          <p:cNvPr id="13" name="Cube 12"/>
+          <p:cNvSpPr/>
+          <p:nvPr/>
+        </p:nvSpPr>
+        <p:spPr>
+          <a:xfrm flipH="1">
+            <a:off x="714348" y="357166"/>
+            <a:ext cx="642942" cy="714380"/>
+          </a:xfrm>
+          <a:prstGeom prst="cube">
+            <a:avLst/>
+          </a:prstGeom>
+          <a:gradFill flip="none" rotWithShape="1">
+            <a:gsLst>
+              <a:gs pos="0">
+                <a:srgbClr val="FFFFFF"/>
+              </a:gs>
+              <a:gs pos="7001">
+                <a:srgbClr val="E6E6E6"/>
+              </a:gs>
+              <a:gs pos="32001">
+                <a:srgbClr val="7D8496"/>
+              </a:gs>
+              <a:gs pos="47000">
+                <a:srgbClr val="E6E6E6"/>
+              </a:gs>
+              <a:gs pos="85001">
+                <a:srgbClr val="7D8496"/>
+              </a:gs>
+              <a:gs pos="100000">
+                <a:srgbClr val="E6E6E6"/>
+              </a:gs>
+            </a:gsLst>
+            <a:lin ang="13500000" scaled="0"/>
+            <a:tileRect/>
+          </a:gradFill>
+          <a:effectLst>
+            <a:outerShdw blurRad="76200" dist="12700" dir="2700000" sy="-23000" kx="-800400" algn="bl" rotWithShape="0">
+              <a:prstClr val="black">
+                <a:alpha val="20000"/>
+              </a:prstClr>
+            </a:outerShdw>
+          </a:effectLst>
+          <a:scene3d>
+            <a:camera prst="isometricOffAxis1Right"/>
+            <a:lightRig rig="threePt" dir="t"/>
+          </a:scene3d>
+        </p:spPr>
+        <p:style>
+          <a:lnRef idx="1">
+            <a:schemeClr val="accent6"/>
+          </a:lnRef>
+          <a:fillRef idx="2">
+            <a:schemeClr val="accent6"/>
+          </a:fillRef>
+          <a:effectRef idx="1">
+            <a:schemeClr val="accent6"/>
+          </a:effectRef>
+          <a:fontRef idx="minor">
+            <a:schemeClr val="dk1"/>
+          </a:fontRef>
+        </p:style>
+        <p:txBody>
+          <a:bodyPr rtlCol="0" anchor="ctr"/>
+          <a:lstStyle/>
+          <a:p>
+            <a:pPr algn="ctr"/>
+            <a:endParaRPr lang="fr-FR" dirty="0"/>
+          </a:p>
+        </p:txBody>
+      </p:sp>
+      <p:pic>
+        <p:nvPicPr>
+          <p:cNvPr id="14" name="Picture 13" descr="ISAE.png"/>
+          <p:cNvPicPr>
+            <a:picLocks noChangeAspect="1"/>
+          </p:cNvPicPr>
+          <p:nvPr/>
+        </p:nvPicPr>
+        <p:blipFill>
+          <a:blip r:embed="rId4"/>
+          <a:stretch>
+            <a:fillRect/>
+          </a:stretch>
+        </p:blipFill>
+        <p:spPr>
+          <a:xfrm>
+            <a:off x="967628" y="571480"/>
+            <a:ext cx="389662" cy="389662"/>
+          </a:xfrm>
+          <a:prstGeom prst="roundRect">
+            <a:avLst>
+              <a:gd name="adj" fmla="val 16667"/>
+            </a:avLst>
+          </a:prstGeom>
+          <a:ln>
+            <a:noFill/>
+          </a:ln>
+          <a:effectLst>
+            <a:outerShdw blurRad="76200" dir="18900000" sy="23000" kx="-1200000" algn="bl" rotWithShape="0">
+              <a:prstClr val="black">
+                <a:alpha val="20000"/>
+              </a:prstClr>
+            </a:outerShdw>
+          </a:effectLst>
+          <a:scene3d>
+            <a:camera prst="isometricOffAxis1Right"/>
+            <a:lightRig rig="threePt" dir="t"/>
+          </a:scene3d>
+          <a:sp3d contourW="6350" prstMaterial="matte">
+            <a:bevelT w="101600" h="101600"/>
+            <a:contourClr>
+              <a:srgbClr val="969696"/>
+            </a:contourClr>
+          </a:sp3d>
+        </p:spPr>
+      </p:pic>
+      <p:sp>
+        <p:nvSpPr>
+          <p:cNvPr id="15" name="TextBox 14"/>
+          <p:cNvSpPr txBox="1"/>
+          <p:nvPr/>
+        </p:nvSpPr>
+        <p:spPr>
+          <a:xfrm>
+            <a:off x="7524328" y="6357958"/>
+            <a:ext cx="1476828" cy="307777"/>
+          </a:xfrm>
+          <a:prstGeom prst="rect">
+            <a:avLst/>
+          </a:prstGeom>
+          <a:noFill/>
+        </p:spPr>
+        <p:txBody>
+          <a:bodyPr wrap="square" rtlCol="0">
+            <a:spAutoFit/>
+          </a:bodyPr>
+          <a:lstStyle/>
+          <a:p>
+            <a:pPr algn="ctr"/>
+            <a:r>
+              <a:rPr lang="fr-FR" sz="1400" b="1" dirty="0" smtClean="0">
+                <a:solidFill>
+                  <a:schemeClr val="accent5">
+                    <a:lumMod val="50000"/>
+                  </a:schemeClr>
+                </a:solidFill>
+                <a:latin typeface="Times New Roman" pitchFamily="18" charset="0"/>
+                <a:cs typeface="Times New Roman" pitchFamily="18" charset="0"/>
+              </a:rPr>
+              <a:t>Page </a:t>
+            </a:r>
+            <a:r>
+              <a:rPr lang="fr-FR" sz="1400" b="1" dirty="0" smtClean="0">
+                <a:solidFill>
+                  <a:schemeClr val="accent5">
+                    <a:lumMod val="50000"/>
+                  </a:schemeClr>
+                </a:solidFill>
+                <a:latin typeface="Times New Roman" pitchFamily="18" charset="0"/>
+                <a:cs typeface="Times New Roman" pitchFamily="18" charset="0"/>
+              </a:rPr>
+              <a:t>12</a:t>
+            </a:r>
+            <a:endParaRPr lang="fr-FR" sz="1400" b="1" dirty="0">
+              <a:solidFill>
+                <a:schemeClr val="accent5">
+                  <a:lumMod val="50000"/>
+                </a:schemeClr>
+              </a:solidFill>
+              <a:latin typeface="Times New Roman" pitchFamily="18" charset="0"/>
+              <a:cs typeface="Times New Roman" pitchFamily="18" charset="0"/>
+            </a:endParaRPr>
+          </a:p>
+        </p:txBody>
+      </p:sp>
+    </p:spTree>
+    <p:extLst>
+      <p:ext uri="{BB962C8B-B14F-4D97-AF65-F5344CB8AC3E}">
+        <p14:creationId xmlns:p14="http://schemas.microsoft.com/office/powerpoint/2010/main" val="4044819355"/>
+      </p:ext>
+    </p:extLst>
+  </p:cSld>
+  <p:clrMapOvr>
+    <a:masterClrMapping/>
+  </p:clrMapOvr>
+  <p:transition>
+    <p:circle/>
+    <p:sndAc>
+      <p:stSnd>
+        <p:snd r:embed="rId2" name="click.wav"/>
+      </p:stSnd>
+    </p:sndAc>
+  </p:transition>
+  <p:timing>
+    <p:tnLst>
+      <p:par>
+        <p:cTn id="1" dur="indefinite" restart="never" nodeType="tmRoot"/>
+      </p:par>
+    </p:tnLst>
+  </p:timing>
+</p:sld>
+</file>
+
+<file path=ppt/slides/slide2.xml><?xml version="1.0" encoding="utf-8"?>
+<p:sld xmlns:a="http://schemas.openxmlformats.org/drawingml/2006/main" xmlns:r="http://schemas.openxmlformats.org/officeDocument/2006/relationships" xmlns:p="http://schemas.openxmlformats.org/presentationml/2006/main">
+  <p:cSld>
+    <p:spTree>
+      <p:nvGrpSpPr>
+        <p:cNvPr id="1" name=""/>
+        <p:cNvGrpSpPr/>
+        <p:nvPr/>
+      </p:nvGrpSpPr>
+      <p:grpSpPr>
+        <a:xfrm>
+          <a:off x="0" y="0"/>
+          <a:ext cx="0" cy="0"/>
+          <a:chOff x="0" y="0"/>
+          <a:chExt cx="0" cy="0"/>
+        </a:xfrm>
+      </p:grpSpPr>
+      <p:sp>
+        <p:nvSpPr>
+          <p:cNvPr id="4" name="Cube 3"/>
+          <p:cNvSpPr/>
+          <p:nvPr/>
+        </p:nvSpPr>
+        <p:spPr>
+          <a:xfrm flipH="1">
+            <a:off x="71406" y="142852"/>
+            <a:ext cx="714380" cy="779324"/>
+          </a:xfrm>
+          <a:prstGeom prst="cube">
+            <a:avLst/>
+          </a:prstGeom>
+          <a:gradFill flip="none" rotWithShape="1">
+            <a:gsLst>
+              <a:gs pos="0">
+                <a:srgbClr val="FFFFFF"/>
+              </a:gs>
+              <a:gs pos="7001">
+                <a:srgbClr val="E6E6E6"/>
+              </a:gs>
+              <a:gs pos="32001">
+                <a:srgbClr val="7D8496"/>
+              </a:gs>
+              <a:gs pos="47000">
+                <a:srgbClr val="E6E6E6"/>
+              </a:gs>
+              <a:gs pos="85001">
+                <a:srgbClr val="7D8496"/>
+              </a:gs>
+              <a:gs pos="100000">
+                <a:srgbClr val="E6E6E6"/>
+              </a:gs>
+            </a:gsLst>
+            <a:lin ang="13500000" scaled="0"/>
+            <a:tileRect/>
+          </a:gradFill>
+          <a:effectLst>
+            <a:outerShdw blurRad="76200" dist="12700" dir="2700000" sy="-23000" kx="-800400" algn="bl" rotWithShape="0">
+              <a:prstClr val="black">
+                <a:alpha val="20000"/>
+              </a:prstClr>
+            </a:outerShdw>
+          </a:effectLst>
+          <a:scene3d>
+            <a:camera prst="isometricOffAxis1Right"/>
+            <a:lightRig rig="threePt" dir="t"/>
+          </a:scene3d>
+        </p:spPr>
+        <p:style>
+          <a:lnRef idx="1">
+            <a:schemeClr val="accent6"/>
+          </a:lnRef>
+          <a:fillRef idx="2">
+            <a:schemeClr val="accent6"/>
+          </a:fillRef>
+          <a:effectRef idx="1">
+            <a:schemeClr val="accent6"/>
+          </a:effectRef>
+          <a:fontRef idx="minor">
+            <a:schemeClr val="dk1"/>
+          </a:fontRef>
+        </p:style>
+        <p:txBody>
+          <a:bodyPr rtlCol="0" anchor="ctr"/>
+          <a:lstStyle/>
+          <a:p>
+            <a:pPr algn="ctr"/>
+            <a:endParaRPr lang="fr-FR" dirty="0"/>
+          </a:p>
+        </p:txBody>
+      </p:sp>
+      <p:sp>
+        <p:nvSpPr>
+          <p:cNvPr id="5" name="Cube 4"/>
+          <p:cNvSpPr/>
+          <p:nvPr/>
+        </p:nvSpPr>
+        <p:spPr>
+          <a:xfrm flipH="1">
+            <a:off x="714348" y="357166"/>
+            <a:ext cx="642942" cy="714380"/>
+          </a:xfrm>
+          <a:prstGeom prst="cube">
+            <a:avLst/>
+          </a:prstGeom>
+          <a:gradFill flip="none" rotWithShape="1">
+            <a:gsLst>
+              <a:gs pos="0">
+                <a:srgbClr val="FFFFFF"/>
+              </a:gs>
+              <a:gs pos="7001">
+                <a:srgbClr val="E6E6E6"/>
+              </a:gs>
+              <a:gs pos="32001">
+                <a:srgbClr val="7D8496"/>
+              </a:gs>
+              <a:gs pos="47000">
+                <a:srgbClr val="E6E6E6"/>
+              </a:gs>
+              <a:gs pos="85001">
+                <a:srgbClr val="7D8496"/>
+              </a:gs>
+              <a:gs pos="100000">
+                <a:srgbClr val="E6E6E6"/>
+              </a:gs>
+            </a:gsLst>
+            <a:lin ang="13500000" scaled="0"/>
+            <a:tileRect/>
+          </a:gradFill>
+          <a:effectLst>
+            <a:outerShdw blurRad="76200" dist="12700" dir="2700000" sy="-23000" kx="-800400" algn="bl" rotWithShape="0">
+              <a:prstClr val="black">
+                <a:alpha val="20000"/>
+              </a:prstClr>
+            </a:outerShdw>
+          </a:effectLst>
+          <a:scene3d>
+            <a:camera prst="isometricOffAxis1Right"/>
+            <a:lightRig rig="threePt" dir="t"/>
+          </a:scene3d>
+        </p:spPr>
+        <p:style>
+          <a:lnRef idx="1">
+            <a:schemeClr val="accent6"/>
+          </a:lnRef>
+          <a:fillRef idx="2">
+            <a:schemeClr val="accent6"/>
+          </a:fillRef>
+          <a:effectRef idx="1">
+            <a:schemeClr val="accent6"/>
+          </a:effectRef>
+          <a:fontRef idx="minor">
+            <a:schemeClr val="dk1"/>
+          </a:fontRef>
+        </p:style>
+        <p:txBody>
+          <a:bodyPr rtlCol="0" anchor="ctr"/>
+          <a:lstStyle/>
+          <a:p>
+            <a:pPr algn="ctr"/>
+            <a:endParaRPr lang="fr-FR" dirty="0"/>
+          </a:p>
+        </p:txBody>
+      </p:sp>
+      <p:pic>
+        <p:nvPicPr>
+          <p:cNvPr id="6" name="Picture 5" descr="ISAE.png"/>
+          <p:cNvPicPr>
+            <a:picLocks noChangeAspect="1"/>
+          </p:cNvPicPr>
+          <p:nvPr/>
+        </p:nvPicPr>
+        <p:blipFill>
+          <a:blip r:embed="rId3"/>
+          <a:stretch>
+            <a:fillRect/>
+          </a:stretch>
+        </p:blipFill>
+        <p:spPr>
+          <a:xfrm>
+            <a:off x="967628" y="571480"/>
+            <a:ext cx="389662" cy="389662"/>
+          </a:xfrm>
+          <a:prstGeom prst="roundRect">
+            <a:avLst>
+              <a:gd name="adj" fmla="val 16667"/>
+            </a:avLst>
+          </a:prstGeom>
+          <a:ln>
+            <a:noFill/>
+          </a:ln>
+          <a:effectLst>
+            <a:outerShdw blurRad="76200" dir="18900000" sy="23000" kx="-1200000" algn="bl" rotWithShape="0">
+              <a:prstClr val="black">
+                <a:alpha val="20000"/>
+              </a:prstClr>
+            </a:outerShdw>
+          </a:effectLst>
+          <a:scene3d>
+            <a:camera prst="isometricOffAxis1Right"/>
+            <a:lightRig rig="threePt" dir="t"/>
+          </a:scene3d>
+          <a:sp3d contourW="6350" prstMaterial="matte">
+            <a:bevelT w="101600" h="101600"/>
+            <a:contourClr>
+              <a:srgbClr val="969696"/>
+            </a:contourClr>
+          </a:sp3d>
+        </p:spPr>
+      </p:pic>
+      <p:sp>
+        <p:nvSpPr>
+          <p:cNvPr id="7" name="Half Frame 6"/>
+          <p:cNvSpPr/>
+          <p:nvPr/>
+        </p:nvSpPr>
+        <p:spPr>
+          <a:xfrm rot="10800000" flipV="1">
+            <a:off x="857224" y="142852"/>
+            <a:ext cx="8001056" cy="428628"/>
+          </a:xfrm>
+          <a:prstGeom prst="halfFrame">
+            <a:avLst/>
+          </a:prstGeom>
+          <a:gradFill>
+            <a:gsLst>
+              <a:gs pos="0">
+                <a:srgbClr val="FFFFFF"/>
+              </a:gs>
+              <a:gs pos="7001">
+                <a:srgbClr val="E6E6E6"/>
+              </a:gs>
+              <a:gs pos="32001">
+                <a:srgbClr val="7D8496"/>
+              </a:gs>
+              <a:gs pos="47000">
+                <a:srgbClr val="E6E6E6"/>
+              </a:gs>
+              <a:gs pos="85001">
+                <a:srgbClr val="7D8496"/>
+              </a:gs>
+              <a:gs pos="100000">
+                <a:srgbClr val="E6E6E6"/>
+              </a:gs>
+            </a:gsLst>
+            <a:lin ang="13500000" scaled="0"/>
+          </a:gradFill>
+          <a:ln w="15875">
+            <a:solidFill>
+              <a:schemeClr val="bg1">
+                <a:lumMod val="75000"/>
+                <a:lumOff val="25000"/>
+              </a:schemeClr>
+            </a:solidFill>
+          </a:ln>
+        </p:spPr>
+        <p:style>
+          <a:lnRef idx="2">
+            <a:schemeClr val="accent1">
+              <a:shade val="50000"/>
+            </a:schemeClr>
+          </a:lnRef>
+          <a:fillRef idx="1">
+            <a:schemeClr val="accent1"/>
+          </a:fillRef>
+          <a:effectRef idx="0">
+            <a:schemeClr val="accent1"/>
+          </a:effectRef>
+          <a:fontRef idx="minor">
+            <a:schemeClr val="lt1"/>
+          </a:fontRef>
+        </p:style>
+        <p:txBody>
+          <a:bodyPr rtlCol="0" anchor="ctr"/>
+          <a:lstStyle/>
+          <a:p>
+            <a:pPr algn="ctr"/>
+            <a:endParaRPr lang="fr-FR" dirty="0">
+              <a:solidFill>
+                <a:schemeClr val="tx1"/>
+              </a:solidFill>
+            </a:endParaRPr>
+          </a:p>
+        </p:txBody>
+      </p:sp>
+      <p:sp>
+        <p:nvSpPr>
+          <p:cNvPr id="8" name="Half Frame 7"/>
+          <p:cNvSpPr/>
+          <p:nvPr/>
+        </p:nvSpPr>
+        <p:spPr>
+          <a:xfrm rot="10800000" flipH="1">
+            <a:off x="142844" y="6357958"/>
+            <a:ext cx="8715436" cy="357190"/>
+          </a:xfrm>
+          <a:prstGeom prst="halfFrame">
+            <a:avLst/>
+          </a:prstGeom>
+          <a:gradFill>
+            <a:gsLst>
+              <a:gs pos="0">
+                <a:srgbClr val="FFFFFF"/>
+              </a:gs>
+              <a:gs pos="7001">
+                <a:srgbClr val="E6E6E6"/>
+              </a:gs>
+              <a:gs pos="32001">
+                <a:srgbClr val="7D8496"/>
+              </a:gs>
+              <a:gs pos="47000">
+                <a:srgbClr val="E6E6E6"/>
+              </a:gs>
+              <a:gs pos="85001">
+                <a:srgbClr val="7D8496"/>
+              </a:gs>
+              <a:gs pos="100000">
+                <a:srgbClr val="E6E6E6"/>
+              </a:gs>
+            </a:gsLst>
+            <a:lin ang="13500000" scaled="0"/>
+          </a:gradFill>
+          <a:ln w="15875">
+            <a:solidFill>
+              <a:schemeClr val="bg1">
+                <a:lumMod val="75000"/>
+                <a:lumOff val="25000"/>
+              </a:schemeClr>
+            </a:solidFill>
+          </a:ln>
+        </p:spPr>
+        <p:style>
+          <a:lnRef idx="2">
+            <a:schemeClr val="accent1">
+              <a:shade val="50000"/>
+            </a:schemeClr>
+          </a:lnRef>
+          <a:fillRef idx="1">
+            <a:schemeClr val="accent1"/>
+          </a:fillRef>
+          <a:effectRef idx="0">
+            <a:schemeClr val="accent1"/>
+          </a:effectRef>
+          <a:fontRef idx="minor">
+            <a:schemeClr val="lt1"/>
+          </a:fontRef>
+        </p:style>
+        <p:txBody>
+          <a:bodyPr rtlCol="0" anchor="ctr"/>
+          <a:lstStyle/>
+          <a:p>
+            <a:pPr algn="ctr"/>
+            <a:endParaRPr lang="fr-FR" dirty="0">
+              <a:solidFill>
+                <a:schemeClr val="tx1"/>
+              </a:solidFill>
+            </a:endParaRPr>
+          </a:p>
+        </p:txBody>
+      </p:sp>
+      <p:sp>
+        <p:nvSpPr>
+          <p:cNvPr id="9" name="Rectangle 8"/>
+          <p:cNvSpPr/>
+          <p:nvPr/>
+        </p:nvSpPr>
+        <p:spPr>
+          <a:xfrm>
+            <a:off x="8715404" y="642918"/>
+            <a:ext cx="142876" cy="5715040"/>
+          </a:xfrm>
+          <a:prstGeom prst="rect">
+            <a:avLst/>
+          </a:prstGeom>
+          <a:solidFill>
+            <a:srgbClr val="B5C0D9"/>
+          </a:solidFill>
+          <a:ln w="15875">
+            <a:solidFill>
+              <a:schemeClr val="bg1">
+                <a:lumMod val="75000"/>
+                <a:lumOff val="25000"/>
+              </a:schemeClr>
+            </a:solidFill>
+          </a:ln>
+        </p:spPr>
+        <p:style>
+          <a:lnRef idx="2">
+            <a:schemeClr val="accent1">
+              <a:shade val="50000"/>
+            </a:schemeClr>
+          </a:lnRef>
+          <a:fillRef idx="1">
+            <a:schemeClr val="accent1"/>
+          </a:fillRef>
+          <a:effectRef idx="0">
+            <a:schemeClr val="accent1"/>
+          </a:effectRef>
+          <a:fontRef idx="minor">
+            <a:schemeClr val="lt1"/>
+          </a:fontRef>
+        </p:style>
+        <p:txBody>
+          <a:bodyPr rtlCol="0" anchor="ctr"/>
+          <a:lstStyle/>
+          <a:p>
+            <a:pPr algn="ctr"/>
+            <a:endParaRPr lang="fr-FR" dirty="0"/>
+          </a:p>
+        </p:txBody>
+      </p:sp>
+      <p:sp>
+        <p:nvSpPr>
+          <p:cNvPr id="10" name="Rectangle 9"/>
+          <p:cNvSpPr/>
+          <p:nvPr/>
+        </p:nvSpPr>
+        <p:spPr>
+          <a:xfrm>
+            <a:off x="142844" y="1214422"/>
+            <a:ext cx="142876" cy="4991136"/>
+          </a:xfrm>
+          <a:prstGeom prst="rect">
+            <a:avLst/>
+          </a:prstGeom>
+          <a:solidFill>
+            <a:srgbClr val="B5C0D9"/>
+          </a:solidFill>
+          <a:ln w="15875">
+            <a:solidFill>
+              <a:schemeClr val="bg1">
+                <a:lumMod val="75000"/>
+                <a:lumOff val="25000"/>
+              </a:schemeClr>
+            </a:solidFill>
+          </a:ln>
+        </p:spPr>
+        <p:style>
+          <a:lnRef idx="2">
+            <a:schemeClr val="accent1">
+              <a:shade val="50000"/>
+            </a:schemeClr>
+          </a:lnRef>
+          <a:fillRef idx="1">
+            <a:schemeClr val="accent1"/>
+          </a:fillRef>
+          <a:effectRef idx="0">
+            <a:schemeClr val="accent1"/>
+          </a:effectRef>
+          <a:fontRef idx="minor">
+            <a:schemeClr val="lt1"/>
+          </a:fontRef>
+        </p:style>
+        <p:txBody>
+          <a:bodyPr rtlCol="0" anchor="ctr"/>
+          <a:lstStyle/>
+          <a:p>
+            <a:pPr algn="ctr"/>
+            <a:endParaRPr lang="fr-FR" dirty="0"/>
+          </a:p>
+        </p:txBody>
+      </p:sp>
+      <p:sp>
+        <p:nvSpPr>
+          <p:cNvPr id="11" name="Rectangle 10"/>
+          <p:cNvSpPr/>
+          <p:nvPr/>
+        </p:nvSpPr>
+        <p:spPr>
+          <a:xfrm>
+            <a:off x="1071538" y="428604"/>
+            <a:ext cx="7929618" cy="630942"/>
+          </a:xfrm>
+          <a:prstGeom prst="rect">
+            <a:avLst/>
+          </a:prstGeom>
+          <a:noFill/>
+        </p:spPr>
+        <p:txBody>
+          <a:bodyPr wrap="square" lIns="91440" tIns="45720" rIns="91440" bIns="45720">
+            <a:spAutoFit/>
+            <a:scene3d>
+              <a:camera prst="orthographicFront"/>
+              <a:lightRig rig="glow" dir="tl">
+                <a:rot lat="0" lon="0" rev="5400000"/>
+              </a:lightRig>
+            </a:scene3d>
+            <a:sp3d contourW="12700">
+              <a:bevelT w="25400" h="25400"/>
+              <a:contourClr>
+                <a:schemeClr val="accent6">
+                  <a:shade val="73000"/>
+                </a:schemeClr>
+              </a:contourClr>
+            </a:sp3d>
+          </a:bodyPr>
+          <a:lstStyle/>
+          <a:p>
+            <a:pPr algn="ctr"/>
+            <a:r>
+              <a:rPr lang="fr-FR" sz="3500" b="1" dirty="0" smtClean="0">
+                <a:ln w="11430"/>
+                <a:gradFill>
+                  <a:gsLst>
+                    <a:gs pos="0">
+                      <a:schemeClr val="accent6">
+                        <a:tint val="90000"/>
+                        <a:satMod val="120000"/>
+                      </a:schemeClr>
+                    </a:gs>
+                    <a:gs pos="25000">
+                      <a:schemeClr val="accent6">
+                        <a:tint val="93000"/>
+                        <a:satMod val="120000"/>
+                      </a:schemeClr>
+                    </a:gs>
+                    <a:gs pos="50000">
+                      <a:schemeClr val="accent6">
+                        <a:shade val="89000"/>
+                        <a:satMod val="110000"/>
+                      </a:schemeClr>
+                    </a:gs>
+                    <a:gs pos="75000">
+                      <a:schemeClr val="accent6">
+                        <a:tint val="93000"/>
+                        <a:satMod val="120000"/>
+                      </a:schemeClr>
+                    </a:gs>
+                    <a:gs pos="100000">
+                      <a:schemeClr val="accent6">
+                        <a:tint val="90000"/>
+                        <a:satMod val="120000"/>
+                      </a:schemeClr>
+                    </a:gs>
+                  </a:gsLst>
+                  <a:lin ang="5400000"/>
+                </a:gradFill>
+                <a:effectLst>
+                  <a:outerShdw blurRad="80000" dist="40000" dir="5040000" algn="tl">
+                    <a:srgbClr val="000000">
+                      <a:alpha val="30000"/>
+                    </a:srgbClr>
+                  </a:outerShdw>
+                </a:effectLst>
+                <a:latin typeface="Times New Roman" pitchFamily="18" charset="0"/>
+                <a:cs typeface="Times New Roman" pitchFamily="18" charset="0"/>
+              </a:rPr>
+              <a:t>Plan du Présentation</a:t>
+            </a:r>
+            <a:endParaRPr lang="fr-FR" sz="3500" b="1" dirty="0">
+              <a:ln w="11430"/>
+              <a:gradFill>
+                <a:gsLst>
+                  <a:gs pos="0">
+                    <a:schemeClr val="accent6">
+                      <a:tint val="90000"/>
+                      <a:satMod val="120000"/>
+                    </a:schemeClr>
+                  </a:gs>
+                  <a:gs pos="25000">
+                    <a:schemeClr val="accent6">
+                      <a:tint val="93000"/>
+                      <a:satMod val="120000"/>
+                    </a:schemeClr>
+                  </a:gs>
+                  <a:gs pos="50000">
+                    <a:schemeClr val="accent6">
+                      <a:shade val="89000"/>
+                      <a:satMod val="110000"/>
+                    </a:schemeClr>
+                  </a:gs>
+                  <a:gs pos="75000">
+                    <a:schemeClr val="accent6">
+                      <a:tint val="93000"/>
+                      <a:satMod val="120000"/>
+                    </a:schemeClr>
+                  </a:gs>
+                  <a:gs pos="100000">
+                    <a:schemeClr val="accent6">
+                      <a:tint val="90000"/>
+                      <a:satMod val="120000"/>
+                    </a:schemeClr>
+                  </a:gs>
+                </a:gsLst>
+                <a:lin ang="5400000"/>
+              </a:gradFill>
+              <a:effectLst>
+                <a:outerShdw blurRad="80000" dist="40000" dir="5040000" algn="tl">
+                  <a:srgbClr val="000000">
+                    <a:alpha val="30000"/>
+                  </a:srgbClr>
+                </a:outerShdw>
+              </a:effectLst>
+              <a:latin typeface="Times New Roman" pitchFamily="18" charset="0"/>
+              <a:cs typeface="Times New Roman" pitchFamily="18" charset="0"/>
+            </a:endParaRPr>
+          </a:p>
+        </p:txBody>
+      </p:sp>
+      <p:pic>
+        <p:nvPicPr>
+          <p:cNvPr id="12" name="Picture 11" descr="C:\Program Files\Microsoft Office\MEDIA\OFFICE11\Lines\BD21338_.gif"/>
+          <p:cNvPicPr/>
+          <p:nvPr/>
+        </p:nvPicPr>
+        <p:blipFill>
+          <a:blip r:embed="rId4"/>
+          <a:srcRect/>
+          <a:stretch>
+            <a:fillRect/>
+          </a:stretch>
+        </p:blipFill>
+        <p:spPr bwMode="auto">
+          <a:xfrm>
+            <a:off x="1393009" y="1000108"/>
+            <a:ext cx="7286676" cy="71438"/>
+          </a:xfrm>
+          <a:prstGeom prst="rect">
+            <a:avLst/>
+          </a:prstGeom>
+          <a:ln>
+            <a:noFill/>
+          </a:ln>
+          <a:effectLst>
+            <a:outerShdw blurRad="292100" dist="139700" dir="2700000" algn="tl" rotWithShape="0">
+              <a:srgbClr val="333333">
+                <a:alpha val="65000"/>
+              </a:srgbClr>
+            </a:outerShdw>
+          </a:effectLst>
+        </p:spPr>
+      </p:pic>
+      <p:pic>
+        <p:nvPicPr>
+          <p:cNvPr id="13" name="Picture 12" descr="cnam.png"/>
+          <p:cNvPicPr>
+            <a:picLocks noChangeAspect="1"/>
+          </p:cNvPicPr>
+          <p:nvPr/>
+        </p:nvPicPr>
+        <p:blipFill>
+          <a:blip r:embed="rId5"/>
+          <a:stretch>
+            <a:fillRect/>
+          </a:stretch>
+        </p:blipFill>
+        <p:spPr>
+          <a:xfrm>
+            <a:off x="357158" y="428604"/>
+            <a:ext cx="428628" cy="428628"/>
+          </a:xfrm>
+          <a:prstGeom prst="roundRect">
+            <a:avLst>
+              <a:gd name="adj" fmla="val 16667"/>
+            </a:avLst>
+          </a:prstGeom>
+          <a:ln>
+            <a:noFill/>
+          </a:ln>
+          <a:effectLst>
+            <a:outerShdw blurRad="76200" dist="38100" dir="7800000" algn="tl" rotWithShape="0">
+              <a:srgbClr val="000000">
+                <a:alpha val="40000"/>
+              </a:srgbClr>
+            </a:outerShdw>
+          </a:effectLst>
+          <a:scene3d>
+            <a:camera prst="isometricOffAxis1Right"/>
+            <a:lightRig rig="contrasting" dir="t">
+              <a:rot lat="0" lon="0" rev="4200000"/>
+            </a:lightRig>
+          </a:scene3d>
+          <a:sp3d prstMaterial="plastic">
+            <a:bevelT w="381000" h="114300" prst="relaxedInset"/>
+            <a:contourClr>
+              <a:srgbClr val="969696"/>
+            </a:contourClr>
+          </a:sp3d>
+        </p:spPr>
+      </p:pic>
+      <p:sp>
+        <p:nvSpPr>
           <p:cNvPr id="14" name="TextBox 13"/>
           <p:cNvSpPr txBox="1"/>
           <p:nvPr/>
@@ -7890,15 +8519,7 @@
                   <a:schemeClr val="bg1"/>
                 </a:solidFill>
               </a:rPr>
-              <a:t> </a:t>
-            </a:r>
-            <a:r>
-              <a:rPr lang="fr-FR" sz="2000" dirty="0" smtClean="0">
-                <a:solidFill>
-                  <a:schemeClr val="bg1"/>
-                </a:solidFill>
-              </a:rPr>
-              <a:t>Releases</a:t>
+              <a:t> Releases</a:t>
             </a:r>
           </a:p>
           <a:p>
@@ -10181,35 +10802,42 @@
           <a:effectLst>
             <a:reflection blurRad="12700" stA="38000" endPos="28000" dist="5000" dir="5400000" sy="-100000" algn="bl" rotWithShape="0"/>
           </a:effectLst>
-          <a:extLst>
-            <a:ext uri="{909E8E84-426E-40DD-AFC4-6F175D3DCCD1}">
-              <a14:hiddenFill xmlns:a14="http://schemas.microsoft.com/office/drawing/2010/main">
-                <a:solidFill>
-                  <a:srgbClr val="FFFFFF"/>
-                </a:solidFill>
-              </a14:hiddenFill>
-            </a:ext>
-          </a:extLst>
+          <a:extLst/>
         </p:spPr>
       </p:pic>
       <p:sp>
         <p:nvSpPr>
-          <p:cNvPr id="3" name="Rectangle 2"/>
+          <p:cNvPr id="15" name="Rectangle 14"/>
           <p:cNvSpPr/>
           <p:nvPr/>
         </p:nvSpPr>
         <p:spPr>
           <a:xfrm>
-            <a:off x="571472" y="1412776"/>
-            <a:ext cx="7960968" cy="3831818"/>
+            <a:off x="438994" y="1340768"/>
+            <a:ext cx="7884107" cy="3831818"/>
           </a:xfrm>
           <a:prstGeom prst="rect">
             <a:avLst/>
           </a:prstGeom>
-        </p:spPr>
-        <p:txBody>
-          <a:bodyPr wrap="square">
+          <a:noFill/>
+        </p:spPr>
+        <p:txBody>
+          <a:bodyPr wrap="square" lIns="91440" tIns="45720" rIns="91440" bIns="45720">
             <a:spAutoFit/>
+            <a:scene3d>
+              <a:camera prst="orthographicFront"/>
+              <a:lightRig rig="flat" dir="tl">
+                <a:rot lat="0" lon="0" rev="6600000"/>
+              </a:lightRig>
+            </a:scene3d>
+            <a:sp3d extrusionH="25400" contourW="8890">
+              <a:bevelT w="38100" h="31750"/>
+              <a:contourClr>
+                <a:schemeClr val="accent2">
+                  <a:shade val="75000"/>
+                </a:schemeClr>
+              </a:contourClr>
+            </a:sp3d>
           </a:bodyPr>
           <a:lstStyle/>
           <a:p>
@@ -10221,70 +10849,32 @@
               <a:buChar char="•"/>
             </a:pPr>
             <a:r>
+              <a:rPr lang="fr-FR" dirty="0" smtClean="0">
+                <a:solidFill>
+                  <a:schemeClr val="bg1"/>
+                </a:solidFill>
+              </a:rPr>
+              <a:t>Version </a:t>
+            </a:r>
+            <a:r>
               <a:rPr lang="fr-FR" dirty="0">
                 <a:solidFill>
-                  <a:schemeClr val="bg2">
-                    <a:lumMod val="50000"/>
-                  </a:schemeClr>
-                </a:solidFill>
-              </a:rPr>
-              <a:t>Version très allégée en mémoire : </a:t>
+                  <a:schemeClr val="bg1"/>
+                </a:solidFill>
+              </a:rPr>
+              <a:t>très allégée en mémoire : Wildfly est moins gourmand en ressources ce qui permet d'allouer plus de mémoire pour vos applications, ce qui assure donc une meilleure exploitation de vos ressources matérielles</a:t>
             </a:r>
             <a:r>
               <a:rPr lang="fr-FR" dirty="0" smtClean="0">
                 <a:solidFill>
-                  <a:schemeClr val="bg2">
-                    <a:lumMod val="50000"/>
-                  </a:schemeClr>
-                </a:solidFill>
-              </a:rPr>
-              <a:t>Wildfly </a:t>
-            </a:r>
-            <a:r>
-              <a:rPr lang="fr-FR" dirty="0">
-                <a:solidFill>
-                  <a:schemeClr val="bg2">
-                    <a:lumMod val="50000"/>
-                  </a:schemeClr>
-                </a:solidFill>
-              </a:rPr>
-              <a:t>est </a:t>
-            </a:r>
-            <a:r>
-              <a:rPr lang="fr-FR" dirty="0" smtClean="0">
-                <a:solidFill>
-                  <a:schemeClr val="bg2">
-                    <a:lumMod val="50000"/>
-                  </a:schemeClr>
-                </a:solidFill>
-              </a:rPr>
-              <a:t>moins </a:t>
-            </a:r>
-            <a:r>
-              <a:rPr lang="fr-FR" dirty="0">
-                <a:solidFill>
-                  <a:schemeClr val="bg2">
-                    <a:lumMod val="50000"/>
-                  </a:schemeClr>
-                </a:solidFill>
-              </a:rPr>
-              <a:t>gourmand en ressources ce qui permet d'allouer plus de mémoire pour vos applications, ce qui assure donc une meilleure exploitation de vos ressources </a:t>
-            </a:r>
-            <a:r>
-              <a:rPr lang="fr-FR" dirty="0" smtClean="0">
-                <a:solidFill>
-                  <a:schemeClr val="bg2">
-                    <a:lumMod val="50000"/>
-                  </a:schemeClr>
-                </a:solidFill>
-              </a:rPr>
-              <a:t>matérielles.</a:t>
+                  <a:schemeClr val="bg1"/>
+                </a:solidFill>
+              </a:rPr>
+              <a:t>.</a:t>
             </a:r>
             <a:endParaRPr lang="fr-FR" dirty="0">
               <a:solidFill>
-                <a:schemeClr val="bg2">
-                  <a:lumMod val="50000"/>
-                </a:schemeClr>
+                <a:schemeClr val="bg1"/>
               </a:solidFill>
             </a:endParaRPr>
           </a:p>
@@ -10297,25 +10887,16 @@
               <a:buChar char="•"/>
             </a:pPr>
             <a:r>
-              <a:rPr lang="en-US" dirty="0" smtClean="0">
-                <a:solidFill>
-                  <a:schemeClr val="bg2">
-                    <a:lumMod val="75000"/>
-                  </a:schemeClr>
+              <a:rPr lang="fr-FR" dirty="0">
+                <a:solidFill>
+                  <a:schemeClr val="bg1"/>
                 </a:solidFill>
               </a:rPr>
               <a:t>Flexible</a:t>
             </a:r>
-            <a:endParaRPr lang="fr-FR" dirty="0" smtClean="0">
-              <a:solidFill>
-                <a:schemeClr val="bg2">
-                  <a:lumMod val="75000"/>
-                </a:schemeClr>
-              </a:solidFill>
-            </a:endParaRPr>
-          </a:p>
-          <a:p>
-            <a:pPr marL="285750" indent="-285750">
+          </a:p>
+          <a:p>
+            <a:pPr marL="285750" indent="-285750" algn="just">
               <a:lnSpc>
                 <a:spcPct val="150000"/>
               </a:lnSpc>
@@ -10323,28 +10904,16 @@
               <a:buChar char="•"/>
             </a:pPr>
             <a:r>
-              <a:rPr lang="fr-FR" dirty="0" smtClean="0">
-                <a:solidFill>
-                  <a:schemeClr val="bg2">
-                    <a:lumMod val="75000"/>
-                  </a:schemeClr>
-                </a:solidFill>
-              </a:rPr>
-              <a:t>Démarrage </a:t>
-            </a:r>
-            <a:r>
               <a:rPr lang="fr-FR" dirty="0">
                 <a:solidFill>
-                  <a:schemeClr val="bg2">
-                    <a:lumMod val="75000"/>
-                  </a:schemeClr>
-                </a:solidFill>
-              </a:rPr>
-              <a:t>extrêmement rapide</a:t>
-            </a:r>
-          </a:p>
-          <a:p>
-            <a:pPr marL="285750" indent="-285750">
+                  <a:schemeClr val="bg1"/>
+                </a:solidFill>
+              </a:rPr>
+              <a:t>Démarrage extrêmement rapide</a:t>
+            </a:r>
+          </a:p>
+          <a:p>
+            <a:pPr marL="285750" indent="-285750" algn="just">
               <a:lnSpc>
                 <a:spcPct val="150000"/>
               </a:lnSpc>
@@ -10354,16 +10923,14 @@
             <a:r>
               <a:rPr lang="fr-FR" dirty="0">
                 <a:solidFill>
-                  <a:schemeClr val="bg2">
-                    <a:lumMod val="75000"/>
-                  </a:schemeClr>
+                  <a:schemeClr val="bg1"/>
                 </a:solidFill>
               </a:rPr>
               <a:t>Gestion de modules pour simplifier les dépendances des librairies (jar)</a:t>
             </a:r>
           </a:p>
           <a:p>
-            <a:pPr marL="285750" indent="-285750">
+            <a:pPr marL="285750" indent="-285750" algn="just">
               <a:lnSpc>
                 <a:spcPct val="150000"/>
               </a:lnSpc>
@@ -10373,16 +10940,14 @@
             <a:r>
               <a:rPr lang="fr-FR" dirty="0">
                 <a:solidFill>
-                  <a:schemeClr val="bg2">
-                    <a:lumMod val="75000"/>
-                  </a:schemeClr>
+                  <a:schemeClr val="bg1"/>
                 </a:solidFill>
               </a:rPr>
               <a:t>Mode Domain permettant de gérer facilement des clusters</a:t>
             </a:r>
           </a:p>
           <a:p>
-            <a:pPr marL="285750" indent="-285750">
+            <a:pPr marL="285750" indent="-285750" algn="just">
               <a:lnSpc>
                 <a:spcPct val="150000"/>
               </a:lnSpc>
@@ -10392,16 +10957,14 @@
             <a:r>
               <a:rPr lang="fr-FR" dirty="0">
                 <a:solidFill>
-                  <a:schemeClr val="bg2">
-                    <a:lumMod val="75000"/>
-                  </a:schemeClr>
+                  <a:schemeClr val="bg1"/>
                 </a:solidFill>
               </a:rPr>
               <a:t>Configuration simplifier avec un seul fichier XML</a:t>
             </a:r>
           </a:p>
           <a:p>
-            <a:pPr marL="285750" indent="-285750">
+            <a:pPr marL="285750" indent="-285750" algn="just">
               <a:lnSpc>
                 <a:spcPct val="150000"/>
               </a:lnSpc>
@@ -10411,33 +10974,40 @@
             <a:r>
               <a:rPr lang="fr-FR" dirty="0">
                 <a:solidFill>
-                  <a:schemeClr val="bg2">
-                    <a:lumMod val="75000"/>
-                  </a:schemeClr>
-                </a:solidFill>
-              </a:rPr>
-              <a:t>Forte communauté de développeurs et très bon support </a:t>
-            </a:r>
-            <a:r>
-              <a:rPr lang="fr-FR" dirty="0" smtClean="0">
-                <a:solidFill>
-                  <a:schemeClr val="bg2">
-                    <a:lumMod val="75000"/>
-                  </a:schemeClr>
-                </a:solidFill>
-              </a:rPr>
-              <a:t>de </a:t>
+                  <a:schemeClr val="bg1"/>
+                </a:solidFill>
+              </a:rPr>
+              <a:t>Forte communauté de développeurs et très bon support de </a:t>
+            </a:r>
+            <a:r>
+              <a:rPr lang="fr-FR" dirty="0" err="1">
+                <a:solidFill>
+                  <a:schemeClr val="bg1"/>
+                </a:solidFill>
+              </a:rPr>
+              <a:t>Red</a:t>
             </a:r>
             <a:r>
               <a:rPr lang="fr-FR" dirty="0">
                 <a:solidFill>
-                  <a:schemeClr val="bg2">
-                    <a:lumMod val="75000"/>
-                  </a:schemeClr>
-                </a:solidFill>
-              </a:rPr>
-              <a:t>Red Hat</a:t>
-            </a:r>
+                  <a:schemeClr val="bg1"/>
+                </a:solidFill>
+              </a:rPr>
+              <a:t> </a:t>
+            </a:r>
+            <a:r>
+              <a:rPr lang="fr-FR" dirty="0" err="1">
+                <a:solidFill>
+                  <a:schemeClr val="bg1"/>
+                </a:solidFill>
+              </a:rPr>
+              <a:t>Hat</a:t>
+            </a:r>
+            <a:endParaRPr lang="fr-FR" dirty="0">
+              <a:solidFill>
+                <a:schemeClr val="bg1"/>
+              </a:solidFill>
+            </a:endParaRPr>
           </a:p>
         </p:txBody>
       </p:sp>
@@ -12527,8 +13097,8 @@
   <p:clrMapOvr>
     <a:masterClrMapping/>
   </p:clrMapOvr>
-  <mc:AlternateContent xmlns:mc="http://schemas.openxmlformats.org/markup-compatibility/2006">
-    <mc:Choice xmlns:p14="http://schemas.microsoft.com/office/powerpoint/2010/main" Requires="p14">
+  <mc:AlternateContent xmlns:mc="http://schemas.openxmlformats.org/markup-compatibility/2006" xmlns:p14="http://schemas.microsoft.com/office/powerpoint/2010/main">
+    <mc:Choice Requires="p14">
       <p:transition spd="med" p14:dur="700">
         <p:fade/>
         <p:sndAc>
@@ -12538,12 +13108,12 @@
         </p:sndAc>
       </p:transition>
     </mc:Choice>
-    <mc:Fallback>
+    <mc:Fallback xmlns="">
       <p:transition spd="med">
         <p:fade/>
         <p:sndAc>
           <p:stSnd>
-            <p:snd r:embed="rId2" name="click.wav"/>
+            <p:snd r:embed="rId6" name="click.wav"/>
           </p:stSnd>
         </p:sndAc>
       </p:transition>
@@ -13106,6 +13676,1055 @@
                 <a:cs typeface="Times New Roman" pitchFamily="18" charset="0"/>
               </a:rPr>
               <a:t>Releases</a:t>
+            </a:r>
+          </a:p>
+        </p:txBody>
+      </p:sp>
+      <p:pic>
+        <p:nvPicPr>
+          <p:cNvPr id="12" name="Picture 11" descr="C:\Program Files\Microsoft Office\MEDIA\OFFICE11\Lines\BD21338_.gif"/>
+          <p:cNvPicPr/>
+          <p:nvPr/>
+        </p:nvPicPr>
+        <p:blipFill>
+          <a:blip r:embed="rId4"/>
+          <a:srcRect/>
+          <a:stretch>
+            <a:fillRect/>
+          </a:stretch>
+        </p:blipFill>
+        <p:spPr bwMode="auto">
+          <a:xfrm>
+            <a:off x="1428728" y="1142984"/>
+            <a:ext cx="7286676" cy="71438"/>
+          </a:xfrm>
+          <a:prstGeom prst="rect">
+            <a:avLst/>
+          </a:prstGeom>
+          <a:ln>
+            <a:noFill/>
+          </a:ln>
+          <a:effectLst>
+            <a:outerShdw blurRad="292100" dist="139700" dir="2700000" algn="tl" rotWithShape="0">
+              <a:srgbClr val="333333">
+                <a:alpha val="65000"/>
+              </a:srgbClr>
+            </a:outerShdw>
+          </a:effectLst>
+        </p:spPr>
+      </p:pic>
+      <p:pic>
+        <p:nvPicPr>
+          <p:cNvPr id="13" name="Picture 12" descr="cnam.png"/>
+          <p:cNvPicPr>
+            <a:picLocks noChangeAspect="1"/>
+          </p:cNvPicPr>
+          <p:nvPr/>
+        </p:nvPicPr>
+        <p:blipFill>
+          <a:blip r:embed="rId5"/>
+          <a:stretch>
+            <a:fillRect/>
+          </a:stretch>
+        </p:blipFill>
+        <p:spPr>
+          <a:xfrm>
+            <a:off x="357158" y="428604"/>
+            <a:ext cx="428628" cy="428628"/>
+          </a:xfrm>
+          <a:prstGeom prst="roundRect">
+            <a:avLst>
+              <a:gd name="adj" fmla="val 16667"/>
+            </a:avLst>
+          </a:prstGeom>
+          <a:ln>
+            <a:noFill/>
+          </a:ln>
+          <a:effectLst>
+            <a:outerShdw blurRad="76200" dist="38100" dir="7800000" algn="tl" rotWithShape="0">
+              <a:srgbClr val="000000">
+                <a:alpha val="40000"/>
+              </a:srgbClr>
+            </a:outerShdw>
+          </a:effectLst>
+          <a:scene3d>
+            <a:camera prst="isometricOffAxis1Right"/>
+            <a:lightRig rig="contrasting" dir="t">
+              <a:rot lat="0" lon="0" rev="4200000"/>
+            </a:lightRig>
+          </a:scene3d>
+          <a:sp3d prstMaterial="plastic">
+            <a:bevelT w="381000" h="114300" prst="relaxedInset"/>
+            <a:contourClr>
+              <a:srgbClr val="969696"/>
+            </a:contourClr>
+          </a:sp3d>
+        </p:spPr>
+      </p:pic>
+      <p:sp>
+        <p:nvSpPr>
+          <p:cNvPr id="14" name="TextBox 13"/>
+          <p:cNvSpPr txBox="1"/>
+          <p:nvPr/>
+        </p:nvSpPr>
+        <p:spPr>
+          <a:xfrm>
+            <a:off x="7524328" y="6357958"/>
+            <a:ext cx="1476828" cy="307777"/>
+          </a:xfrm>
+          <a:prstGeom prst="rect">
+            <a:avLst/>
+          </a:prstGeom>
+          <a:noFill/>
+        </p:spPr>
+        <p:txBody>
+          <a:bodyPr wrap="square" rtlCol="0">
+            <a:spAutoFit/>
+          </a:bodyPr>
+          <a:lstStyle/>
+          <a:p>
+            <a:pPr algn="ctr"/>
+            <a:r>
+              <a:rPr lang="fr-FR" sz="1400" b="1" dirty="0" smtClean="0">
+                <a:solidFill>
+                  <a:schemeClr val="accent5">
+                    <a:lumMod val="50000"/>
+                  </a:schemeClr>
+                </a:solidFill>
+                <a:latin typeface="Times New Roman" pitchFamily="18" charset="0"/>
+                <a:cs typeface="Times New Roman" pitchFamily="18" charset="0"/>
+              </a:rPr>
+              <a:t>Page 7</a:t>
+            </a:r>
+            <a:endParaRPr lang="fr-FR" sz="1400" b="1" dirty="0">
+              <a:solidFill>
+                <a:schemeClr val="accent5">
+                  <a:lumMod val="50000"/>
+                </a:schemeClr>
+              </a:solidFill>
+              <a:latin typeface="Times New Roman" pitchFamily="18" charset="0"/>
+              <a:cs typeface="Times New Roman" pitchFamily="18" charset="0"/>
+            </a:endParaRPr>
+          </a:p>
+        </p:txBody>
+      </p:sp>
+      <p:sp>
+        <p:nvSpPr>
+          <p:cNvPr id="15" name="Rectangle 14"/>
+          <p:cNvSpPr/>
+          <p:nvPr/>
+        </p:nvSpPr>
+        <p:spPr>
+          <a:xfrm>
+            <a:off x="842187" y="1628800"/>
+            <a:ext cx="7403299" cy="3970318"/>
+          </a:xfrm>
+          <a:prstGeom prst="rect">
+            <a:avLst/>
+          </a:prstGeom>
+          <a:noFill/>
+        </p:spPr>
+        <p:txBody>
+          <a:bodyPr wrap="square" lIns="91440" tIns="45720" rIns="91440" bIns="45720">
+            <a:spAutoFit/>
+            <a:scene3d>
+              <a:camera prst="orthographicFront"/>
+              <a:lightRig rig="flat" dir="tl">
+                <a:rot lat="0" lon="0" rev="6600000"/>
+              </a:lightRig>
+            </a:scene3d>
+            <a:sp3d extrusionH="25400" contourW="8890">
+              <a:bevelT w="38100" h="31750"/>
+              <a:contourClr>
+                <a:schemeClr val="accent2">
+                  <a:shade val="75000"/>
+                </a:schemeClr>
+              </a:contourClr>
+            </a:sp3d>
+          </a:bodyPr>
+          <a:lstStyle/>
+          <a:p>
+            <a:pPr marL="285750" indent="-285750">
+              <a:lnSpc>
+                <a:spcPct val="200000"/>
+              </a:lnSpc>
+              <a:buFont typeface="Wingdings" pitchFamily="2" charset="2"/>
+              <a:buChar char="Ø"/>
+            </a:pPr>
+            <a:r>
+              <a:rPr lang="fr-FR" dirty="0" smtClean="0">
+                <a:solidFill>
+                  <a:schemeClr val="bg2">
+                    <a:lumMod val="50000"/>
+                  </a:schemeClr>
+                </a:solidFill>
+              </a:rPr>
+              <a:t>JBoss </a:t>
+            </a:r>
+            <a:r>
+              <a:rPr lang="fr-FR" dirty="0">
+                <a:solidFill>
+                  <a:schemeClr val="bg2">
+                    <a:lumMod val="50000"/>
+                  </a:schemeClr>
+                </a:solidFill>
+              </a:rPr>
+              <a:t>AS 2 ==&gt; J2EE 1.2 </a:t>
+            </a:r>
+            <a:endParaRPr lang="fr-FR" dirty="0" smtClean="0">
+              <a:solidFill>
+                <a:schemeClr val="bg2">
+                  <a:lumMod val="50000"/>
+                </a:schemeClr>
+              </a:solidFill>
+            </a:endParaRPr>
+          </a:p>
+          <a:p>
+            <a:pPr marL="285750" indent="-285750">
+              <a:lnSpc>
+                <a:spcPct val="200000"/>
+              </a:lnSpc>
+              <a:buFont typeface="Wingdings" pitchFamily="2" charset="2"/>
+              <a:buChar char="Ø"/>
+            </a:pPr>
+            <a:r>
+              <a:rPr lang="fr-FR" dirty="0" smtClean="0">
+                <a:solidFill>
+                  <a:schemeClr val="bg2">
+                    <a:lumMod val="50000"/>
+                  </a:schemeClr>
+                </a:solidFill>
+              </a:rPr>
+              <a:t> </a:t>
+            </a:r>
+            <a:r>
+              <a:rPr lang="fr-FR" dirty="0">
+                <a:solidFill>
+                  <a:schemeClr val="bg2">
+                    <a:lumMod val="50000"/>
+                  </a:schemeClr>
+                </a:solidFill>
+              </a:rPr>
+              <a:t>JBoss AS 3 ==&gt; J2EE 1.3 </a:t>
+            </a:r>
+            <a:endParaRPr lang="fr-FR" dirty="0" smtClean="0">
+              <a:solidFill>
+                <a:schemeClr val="bg2">
+                  <a:lumMod val="50000"/>
+                </a:schemeClr>
+              </a:solidFill>
+            </a:endParaRPr>
+          </a:p>
+          <a:p>
+            <a:pPr marL="285750" indent="-285750">
+              <a:lnSpc>
+                <a:spcPct val="200000"/>
+              </a:lnSpc>
+              <a:buFont typeface="Wingdings" pitchFamily="2" charset="2"/>
+              <a:buChar char="Ø"/>
+            </a:pPr>
+            <a:r>
+              <a:rPr lang="fr-FR" dirty="0" smtClean="0">
+                <a:solidFill>
+                  <a:schemeClr val="bg2">
+                    <a:lumMod val="50000"/>
+                  </a:schemeClr>
+                </a:solidFill>
+              </a:rPr>
+              <a:t>JBoss </a:t>
+            </a:r>
+            <a:r>
+              <a:rPr lang="fr-FR" dirty="0">
+                <a:solidFill>
+                  <a:schemeClr val="bg2">
+                    <a:lumMod val="50000"/>
+                  </a:schemeClr>
+                </a:solidFill>
+              </a:rPr>
+              <a:t>AS 4 ==&gt; J2EE 1.4 </a:t>
+            </a:r>
+            <a:endParaRPr lang="fr-FR" dirty="0" smtClean="0">
+              <a:solidFill>
+                <a:schemeClr val="bg2">
+                  <a:lumMod val="50000"/>
+                </a:schemeClr>
+              </a:solidFill>
+            </a:endParaRPr>
+          </a:p>
+          <a:p>
+            <a:pPr marL="285750" indent="-285750">
+              <a:lnSpc>
+                <a:spcPct val="200000"/>
+              </a:lnSpc>
+              <a:buFont typeface="Wingdings" pitchFamily="2" charset="2"/>
+              <a:buChar char="Ø"/>
+            </a:pPr>
+            <a:r>
+              <a:rPr lang="fr-FR" dirty="0" smtClean="0">
+                <a:solidFill>
+                  <a:schemeClr val="bg2">
+                    <a:lumMod val="50000"/>
+                  </a:schemeClr>
+                </a:solidFill>
+              </a:rPr>
+              <a:t> </a:t>
+            </a:r>
+            <a:r>
+              <a:rPr lang="fr-FR" dirty="0">
+                <a:solidFill>
+                  <a:schemeClr val="bg2">
+                    <a:lumMod val="50000"/>
+                  </a:schemeClr>
+                </a:solidFill>
+              </a:rPr>
+              <a:t>JBoss AS 5 ==&gt; Java EE 5 </a:t>
+            </a:r>
+            <a:endParaRPr lang="fr-FR" dirty="0" smtClean="0">
+              <a:solidFill>
+                <a:schemeClr val="bg2">
+                  <a:lumMod val="50000"/>
+                </a:schemeClr>
+              </a:solidFill>
+            </a:endParaRPr>
+          </a:p>
+          <a:p>
+            <a:pPr marL="285750" indent="-285750">
+              <a:lnSpc>
+                <a:spcPct val="200000"/>
+              </a:lnSpc>
+              <a:buFont typeface="Wingdings" pitchFamily="2" charset="2"/>
+              <a:buChar char="Ø"/>
+            </a:pPr>
+            <a:r>
+              <a:rPr lang="fr-FR" dirty="0" smtClean="0">
+                <a:solidFill>
+                  <a:schemeClr val="bg2">
+                    <a:lumMod val="50000"/>
+                  </a:schemeClr>
+                </a:solidFill>
+              </a:rPr>
+              <a:t> </a:t>
+            </a:r>
+            <a:r>
+              <a:rPr lang="fr-FR" dirty="0">
+                <a:solidFill>
+                  <a:schemeClr val="bg2">
+                    <a:lumMod val="50000"/>
+                  </a:schemeClr>
+                </a:solidFill>
+              </a:rPr>
+              <a:t>JBoss AS 6, AS7 ==&gt; Java EE </a:t>
+            </a:r>
+            <a:r>
+              <a:rPr lang="fr-FR" dirty="0" smtClean="0">
+                <a:solidFill>
+                  <a:schemeClr val="bg2">
+                    <a:lumMod val="50000"/>
+                  </a:schemeClr>
+                </a:solidFill>
+              </a:rPr>
+              <a:t>6</a:t>
+            </a:r>
+          </a:p>
+          <a:p>
+            <a:pPr marL="285750" indent="-285750">
+              <a:lnSpc>
+                <a:spcPct val="200000"/>
+              </a:lnSpc>
+              <a:buFont typeface="Wingdings" pitchFamily="2" charset="2"/>
+              <a:buChar char="Ø"/>
+            </a:pPr>
+            <a:r>
+              <a:rPr lang="fr-FR" dirty="0" smtClean="0">
+                <a:solidFill>
+                  <a:schemeClr val="bg2">
+                    <a:lumMod val="50000"/>
+                  </a:schemeClr>
+                </a:solidFill>
+              </a:rPr>
+              <a:t>WildFly </a:t>
+            </a:r>
+            <a:r>
+              <a:rPr lang="fr-FR" dirty="0">
+                <a:solidFill>
+                  <a:schemeClr val="bg2">
+                    <a:lumMod val="50000"/>
+                  </a:schemeClr>
+                </a:solidFill>
+              </a:rPr>
+              <a:t>8, 9, 10 ==&gt; Java EE 7</a:t>
+            </a:r>
+            <a:endParaRPr lang="en-US" dirty="0" smtClean="0">
+              <a:solidFill>
+                <a:schemeClr val="bg2">
+                  <a:lumMod val="50000"/>
+                </a:schemeClr>
+              </a:solidFill>
+            </a:endParaRPr>
+          </a:p>
+          <a:p>
+            <a:pPr>
+              <a:lnSpc>
+                <a:spcPct val="200000"/>
+              </a:lnSpc>
+            </a:pPr>
+            <a:endParaRPr lang="fr-FR" b="1" cap="none" spc="0" dirty="0">
+              <a:ln w="11430"/>
+              <a:solidFill>
+                <a:schemeClr val="bg2">
+                  <a:lumMod val="50000"/>
+                </a:schemeClr>
+              </a:solidFill>
+              <a:effectLst>
+                <a:outerShdw blurRad="50800" dist="39000" dir="5460000" algn="tl">
+                  <a:srgbClr val="000000">
+                    <a:alpha val="38000"/>
+                  </a:srgbClr>
+                </a:outerShdw>
+              </a:effectLst>
+            </a:endParaRPr>
+          </a:p>
+        </p:txBody>
+      </p:sp>
+    </p:spTree>
+    <p:extLst>
+      <p:ext uri="{BB962C8B-B14F-4D97-AF65-F5344CB8AC3E}">
+        <p14:creationId xmlns:p14="http://schemas.microsoft.com/office/powerpoint/2010/main" val="2654403344"/>
+      </p:ext>
+    </p:extLst>
+  </p:cSld>
+  <p:clrMapOvr>
+    <a:masterClrMapping/>
+  </p:clrMapOvr>
+  <mc:AlternateContent xmlns:mc="http://schemas.openxmlformats.org/markup-compatibility/2006" xmlns:p14="http://schemas.microsoft.com/office/powerpoint/2010/main">
+    <mc:Choice Requires="p14">
+      <p:transition spd="med" p14:dur="700">
+        <p:fade/>
+        <p:sndAc>
+          <p:stSnd>
+            <p:snd r:embed="rId2" name="click.wav"/>
+          </p:stSnd>
+        </p:sndAc>
+      </p:transition>
+    </mc:Choice>
+    <mc:Fallback xmlns="">
+      <p:transition spd="med">
+        <p:fade/>
+        <p:sndAc>
+          <p:stSnd>
+            <p:snd r:embed="rId6" name="click.wav"/>
+          </p:stSnd>
+        </p:sndAc>
+      </p:transition>
+    </mc:Fallback>
+  </mc:AlternateContent>
+  <p:timing>
+    <p:tnLst>
+      <p:par>
+        <p:cTn id="1" dur="indefinite" restart="never" nodeType="tmRoot"/>
+      </p:par>
+    </p:tnLst>
+  </p:timing>
+</p:sld>
+</file>
+
+<file path=ppt/slides/slide8.xml><?xml version="1.0" encoding="utf-8"?>
+<p:sld xmlns:a="http://schemas.openxmlformats.org/drawingml/2006/main" xmlns:r="http://schemas.openxmlformats.org/officeDocument/2006/relationships" xmlns:p="http://schemas.openxmlformats.org/presentationml/2006/main">
+  <p:cSld>
+    <p:spTree>
+      <p:nvGrpSpPr>
+        <p:cNvPr id="1" name=""/>
+        <p:cNvGrpSpPr/>
+        <p:nvPr/>
+      </p:nvGrpSpPr>
+      <p:grpSpPr>
+        <a:xfrm>
+          <a:off x="0" y="0"/>
+          <a:ext cx="0" cy="0"/>
+          <a:chOff x="0" y="0"/>
+          <a:chExt cx="0" cy="0"/>
+        </a:xfrm>
+      </p:grpSpPr>
+      <p:sp>
+        <p:nvSpPr>
+          <p:cNvPr id="4" name="Cube 3"/>
+          <p:cNvSpPr/>
+          <p:nvPr/>
+        </p:nvSpPr>
+        <p:spPr>
+          <a:xfrm flipH="1">
+            <a:off x="71406" y="142852"/>
+            <a:ext cx="714380" cy="779324"/>
+          </a:xfrm>
+          <a:prstGeom prst="cube">
+            <a:avLst/>
+          </a:prstGeom>
+          <a:gradFill flip="none" rotWithShape="1">
+            <a:gsLst>
+              <a:gs pos="0">
+                <a:srgbClr val="FFFFFF"/>
+              </a:gs>
+              <a:gs pos="7001">
+                <a:srgbClr val="E6E6E6"/>
+              </a:gs>
+              <a:gs pos="32001">
+                <a:srgbClr val="7D8496"/>
+              </a:gs>
+              <a:gs pos="47000">
+                <a:srgbClr val="E6E6E6"/>
+              </a:gs>
+              <a:gs pos="85001">
+                <a:srgbClr val="7D8496"/>
+              </a:gs>
+              <a:gs pos="100000">
+                <a:srgbClr val="E6E6E6"/>
+              </a:gs>
+            </a:gsLst>
+            <a:lin ang="13500000" scaled="0"/>
+            <a:tileRect/>
+          </a:gradFill>
+          <a:effectLst>
+            <a:outerShdw blurRad="76200" dist="12700" dir="2700000" sy="-23000" kx="-800400" algn="bl" rotWithShape="0">
+              <a:prstClr val="black">
+                <a:alpha val="20000"/>
+              </a:prstClr>
+            </a:outerShdw>
+          </a:effectLst>
+          <a:scene3d>
+            <a:camera prst="isometricOffAxis1Right"/>
+            <a:lightRig rig="threePt" dir="t"/>
+          </a:scene3d>
+        </p:spPr>
+        <p:style>
+          <a:lnRef idx="1">
+            <a:schemeClr val="accent6"/>
+          </a:lnRef>
+          <a:fillRef idx="2">
+            <a:schemeClr val="accent6"/>
+          </a:fillRef>
+          <a:effectRef idx="1">
+            <a:schemeClr val="accent6"/>
+          </a:effectRef>
+          <a:fontRef idx="minor">
+            <a:schemeClr val="dk1"/>
+          </a:fontRef>
+        </p:style>
+        <p:txBody>
+          <a:bodyPr rtlCol="0" anchor="ctr"/>
+          <a:lstStyle/>
+          <a:p>
+            <a:pPr algn="ctr"/>
+            <a:endParaRPr lang="fr-FR" dirty="0"/>
+          </a:p>
+        </p:txBody>
+      </p:sp>
+      <p:sp>
+        <p:nvSpPr>
+          <p:cNvPr id="5" name="Cube 4"/>
+          <p:cNvSpPr/>
+          <p:nvPr/>
+        </p:nvSpPr>
+        <p:spPr>
+          <a:xfrm flipH="1">
+            <a:off x="714348" y="357166"/>
+            <a:ext cx="642942" cy="714380"/>
+          </a:xfrm>
+          <a:prstGeom prst="cube">
+            <a:avLst/>
+          </a:prstGeom>
+          <a:gradFill flip="none" rotWithShape="1">
+            <a:gsLst>
+              <a:gs pos="0">
+                <a:srgbClr val="FFFFFF"/>
+              </a:gs>
+              <a:gs pos="7001">
+                <a:srgbClr val="E6E6E6"/>
+              </a:gs>
+              <a:gs pos="32001">
+                <a:srgbClr val="7D8496"/>
+              </a:gs>
+              <a:gs pos="47000">
+                <a:srgbClr val="E6E6E6"/>
+              </a:gs>
+              <a:gs pos="85001">
+                <a:srgbClr val="7D8496"/>
+              </a:gs>
+              <a:gs pos="100000">
+                <a:srgbClr val="E6E6E6"/>
+              </a:gs>
+            </a:gsLst>
+            <a:lin ang="13500000" scaled="0"/>
+            <a:tileRect/>
+          </a:gradFill>
+          <a:effectLst>
+            <a:outerShdw blurRad="76200" dist="12700" dir="2700000" sy="-23000" kx="-800400" algn="bl" rotWithShape="0">
+              <a:prstClr val="black">
+                <a:alpha val="20000"/>
+              </a:prstClr>
+            </a:outerShdw>
+          </a:effectLst>
+          <a:scene3d>
+            <a:camera prst="isometricOffAxis1Right"/>
+            <a:lightRig rig="threePt" dir="t"/>
+          </a:scene3d>
+        </p:spPr>
+        <p:style>
+          <a:lnRef idx="1">
+            <a:schemeClr val="accent6"/>
+          </a:lnRef>
+          <a:fillRef idx="2">
+            <a:schemeClr val="accent6"/>
+          </a:fillRef>
+          <a:effectRef idx="1">
+            <a:schemeClr val="accent6"/>
+          </a:effectRef>
+          <a:fontRef idx="minor">
+            <a:schemeClr val="dk1"/>
+          </a:fontRef>
+        </p:style>
+        <p:txBody>
+          <a:bodyPr rtlCol="0" anchor="ctr"/>
+          <a:lstStyle/>
+          <a:p>
+            <a:pPr algn="ctr"/>
+            <a:endParaRPr lang="fr-FR" dirty="0"/>
+          </a:p>
+        </p:txBody>
+      </p:sp>
+      <p:pic>
+        <p:nvPicPr>
+          <p:cNvPr id="6" name="Picture 5" descr="ISAE.png"/>
+          <p:cNvPicPr>
+            <a:picLocks noChangeAspect="1"/>
+          </p:cNvPicPr>
+          <p:nvPr/>
+        </p:nvPicPr>
+        <p:blipFill>
+          <a:blip r:embed="rId3"/>
+          <a:stretch>
+            <a:fillRect/>
+          </a:stretch>
+        </p:blipFill>
+        <p:spPr>
+          <a:xfrm>
+            <a:off x="967628" y="571480"/>
+            <a:ext cx="389662" cy="389662"/>
+          </a:xfrm>
+          <a:prstGeom prst="roundRect">
+            <a:avLst>
+              <a:gd name="adj" fmla="val 16667"/>
+            </a:avLst>
+          </a:prstGeom>
+          <a:ln>
+            <a:noFill/>
+          </a:ln>
+          <a:effectLst>
+            <a:outerShdw blurRad="76200" dir="18900000" sy="23000" kx="-1200000" algn="bl" rotWithShape="0">
+              <a:prstClr val="black">
+                <a:alpha val="20000"/>
+              </a:prstClr>
+            </a:outerShdw>
+          </a:effectLst>
+          <a:scene3d>
+            <a:camera prst="isometricOffAxis1Right"/>
+            <a:lightRig rig="threePt" dir="t"/>
+          </a:scene3d>
+          <a:sp3d contourW="6350" prstMaterial="matte">
+            <a:bevelT w="101600" h="101600"/>
+            <a:contourClr>
+              <a:srgbClr val="969696"/>
+            </a:contourClr>
+          </a:sp3d>
+        </p:spPr>
+      </p:pic>
+      <p:sp>
+        <p:nvSpPr>
+          <p:cNvPr id="7" name="Half Frame 6"/>
+          <p:cNvSpPr/>
+          <p:nvPr/>
+        </p:nvSpPr>
+        <p:spPr>
+          <a:xfrm rot="10800000" flipV="1">
+            <a:off x="857224" y="142852"/>
+            <a:ext cx="8001056" cy="428628"/>
+          </a:xfrm>
+          <a:prstGeom prst="halfFrame">
+            <a:avLst/>
+          </a:prstGeom>
+          <a:gradFill>
+            <a:gsLst>
+              <a:gs pos="0">
+                <a:srgbClr val="FFFFFF"/>
+              </a:gs>
+              <a:gs pos="7001">
+                <a:srgbClr val="E6E6E6"/>
+              </a:gs>
+              <a:gs pos="32001">
+                <a:srgbClr val="7D8496"/>
+              </a:gs>
+              <a:gs pos="47000">
+                <a:srgbClr val="E6E6E6"/>
+              </a:gs>
+              <a:gs pos="85001">
+                <a:srgbClr val="7D8496"/>
+              </a:gs>
+              <a:gs pos="100000">
+                <a:srgbClr val="E6E6E6"/>
+              </a:gs>
+            </a:gsLst>
+            <a:lin ang="13500000" scaled="0"/>
+          </a:gradFill>
+          <a:ln w="15875">
+            <a:solidFill>
+              <a:schemeClr val="bg1">
+                <a:lumMod val="75000"/>
+                <a:lumOff val="25000"/>
+              </a:schemeClr>
+            </a:solidFill>
+          </a:ln>
+        </p:spPr>
+        <p:style>
+          <a:lnRef idx="2">
+            <a:schemeClr val="accent1">
+              <a:shade val="50000"/>
+            </a:schemeClr>
+          </a:lnRef>
+          <a:fillRef idx="1">
+            <a:schemeClr val="accent1"/>
+          </a:fillRef>
+          <a:effectRef idx="0">
+            <a:schemeClr val="accent1"/>
+          </a:effectRef>
+          <a:fontRef idx="minor">
+            <a:schemeClr val="lt1"/>
+          </a:fontRef>
+        </p:style>
+        <p:txBody>
+          <a:bodyPr rtlCol="0" anchor="ctr"/>
+          <a:lstStyle/>
+          <a:p>
+            <a:pPr algn="ctr"/>
+            <a:endParaRPr lang="fr-FR" dirty="0">
+              <a:solidFill>
+                <a:schemeClr val="tx1"/>
+              </a:solidFill>
+            </a:endParaRPr>
+          </a:p>
+        </p:txBody>
+      </p:sp>
+      <p:sp>
+        <p:nvSpPr>
+          <p:cNvPr id="8" name="Half Frame 7"/>
+          <p:cNvSpPr/>
+          <p:nvPr/>
+        </p:nvSpPr>
+        <p:spPr>
+          <a:xfrm rot="10800000" flipH="1">
+            <a:off x="142844" y="6357958"/>
+            <a:ext cx="8715436" cy="357190"/>
+          </a:xfrm>
+          <a:prstGeom prst="halfFrame">
+            <a:avLst/>
+          </a:prstGeom>
+          <a:gradFill>
+            <a:gsLst>
+              <a:gs pos="0">
+                <a:srgbClr val="FFFFFF"/>
+              </a:gs>
+              <a:gs pos="7001">
+                <a:srgbClr val="E6E6E6"/>
+              </a:gs>
+              <a:gs pos="32001">
+                <a:srgbClr val="7D8496"/>
+              </a:gs>
+              <a:gs pos="47000">
+                <a:srgbClr val="E6E6E6"/>
+              </a:gs>
+              <a:gs pos="85001">
+                <a:srgbClr val="7D8496"/>
+              </a:gs>
+              <a:gs pos="100000">
+                <a:srgbClr val="E6E6E6"/>
+              </a:gs>
+            </a:gsLst>
+            <a:lin ang="13500000" scaled="0"/>
+          </a:gradFill>
+          <a:ln w="15875">
+            <a:solidFill>
+              <a:schemeClr val="bg1">
+                <a:lumMod val="75000"/>
+                <a:lumOff val="25000"/>
+              </a:schemeClr>
+            </a:solidFill>
+          </a:ln>
+        </p:spPr>
+        <p:style>
+          <a:lnRef idx="2">
+            <a:schemeClr val="accent1">
+              <a:shade val="50000"/>
+            </a:schemeClr>
+          </a:lnRef>
+          <a:fillRef idx="1">
+            <a:schemeClr val="accent1"/>
+          </a:fillRef>
+          <a:effectRef idx="0">
+            <a:schemeClr val="accent1"/>
+          </a:effectRef>
+          <a:fontRef idx="minor">
+            <a:schemeClr val="lt1"/>
+          </a:fontRef>
+        </p:style>
+        <p:txBody>
+          <a:bodyPr rtlCol="0" anchor="ctr"/>
+          <a:lstStyle/>
+          <a:p>
+            <a:pPr algn="ctr"/>
+            <a:endParaRPr lang="fr-FR" dirty="0">
+              <a:solidFill>
+                <a:schemeClr val="tx1"/>
+              </a:solidFill>
+            </a:endParaRPr>
+          </a:p>
+        </p:txBody>
+      </p:sp>
+      <p:sp>
+        <p:nvSpPr>
+          <p:cNvPr id="9" name="Rectangle 8"/>
+          <p:cNvSpPr/>
+          <p:nvPr/>
+        </p:nvSpPr>
+        <p:spPr>
+          <a:xfrm>
+            <a:off x="8715404" y="642918"/>
+            <a:ext cx="142876" cy="5715040"/>
+          </a:xfrm>
+          <a:prstGeom prst="rect">
+            <a:avLst/>
+          </a:prstGeom>
+          <a:solidFill>
+            <a:srgbClr val="B5C0D9"/>
+          </a:solidFill>
+          <a:ln w="15875">
+            <a:solidFill>
+              <a:schemeClr val="bg1">
+                <a:lumMod val="75000"/>
+                <a:lumOff val="25000"/>
+              </a:schemeClr>
+            </a:solidFill>
+          </a:ln>
+        </p:spPr>
+        <p:style>
+          <a:lnRef idx="2">
+            <a:schemeClr val="accent1">
+              <a:shade val="50000"/>
+            </a:schemeClr>
+          </a:lnRef>
+          <a:fillRef idx="1">
+            <a:schemeClr val="accent1"/>
+          </a:fillRef>
+          <a:effectRef idx="0">
+            <a:schemeClr val="accent1"/>
+          </a:effectRef>
+          <a:fontRef idx="minor">
+            <a:schemeClr val="lt1"/>
+          </a:fontRef>
+        </p:style>
+        <p:txBody>
+          <a:bodyPr rtlCol="0" anchor="ctr"/>
+          <a:lstStyle/>
+          <a:p>
+            <a:pPr algn="ctr"/>
+            <a:endParaRPr lang="fr-FR" dirty="0"/>
+          </a:p>
+        </p:txBody>
+      </p:sp>
+      <p:sp>
+        <p:nvSpPr>
+          <p:cNvPr id="10" name="Rectangle 9"/>
+          <p:cNvSpPr/>
+          <p:nvPr/>
+        </p:nvSpPr>
+        <p:spPr>
+          <a:xfrm>
+            <a:off x="142844" y="1214422"/>
+            <a:ext cx="142876" cy="4991136"/>
+          </a:xfrm>
+          <a:prstGeom prst="rect">
+            <a:avLst/>
+          </a:prstGeom>
+          <a:solidFill>
+            <a:srgbClr val="B5C0D9"/>
+          </a:solidFill>
+          <a:ln w="15875">
+            <a:solidFill>
+              <a:schemeClr val="bg1">
+                <a:lumMod val="75000"/>
+                <a:lumOff val="25000"/>
+              </a:schemeClr>
+            </a:solidFill>
+          </a:ln>
+        </p:spPr>
+        <p:style>
+          <a:lnRef idx="2">
+            <a:schemeClr val="accent1">
+              <a:shade val="50000"/>
+            </a:schemeClr>
+          </a:lnRef>
+          <a:fillRef idx="1">
+            <a:schemeClr val="accent1"/>
+          </a:fillRef>
+          <a:effectRef idx="0">
+            <a:schemeClr val="accent1"/>
+          </a:effectRef>
+          <a:fontRef idx="minor">
+            <a:schemeClr val="lt1"/>
+          </a:fontRef>
+        </p:style>
+        <p:txBody>
+          <a:bodyPr rtlCol="0" anchor="ctr"/>
+          <a:lstStyle/>
+          <a:p>
+            <a:pPr algn="ctr"/>
+            <a:endParaRPr lang="fr-FR" dirty="0"/>
+          </a:p>
+        </p:txBody>
+      </p:sp>
+      <p:sp>
+        <p:nvSpPr>
+          <p:cNvPr id="11" name="Rectangle 10"/>
+          <p:cNvSpPr/>
+          <p:nvPr/>
+        </p:nvSpPr>
+        <p:spPr>
+          <a:xfrm>
+            <a:off x="1071538" y="428604"/>
+            <a:ext cx="7929618" cy="630942"/>
+          </a:xfrm>
+          <a:prstGeom prst="rect">
+            <a:avLst/>
+          </a:prstGeom>
+          <a:noFill/>
+        </p:spPr>
+        <p:txBody>
+          <a:bodyPr wrap="square" lIns="91440" tIns="45720" rIns="91440" bIns="45720">
+            <a:spAutoFit/>
+            <a:scene3d>
+              <a:camera prst="orthographicFront"/>
+              <a:lightRig rig="glow" dir="tl">
+                <a:rot lat="0" lon="0" rev="5400000"/>
+              </a:lightRig>
+            </a:scene3d>
+            <a:sp3d contourW="12700">
+              <a:bevelT w="25400" h="25400"/>
+              <a:contourClr>
+                <a:schemeClr val="accent6">
+                  <a:shade val="73000"/>
+                </a:schemeClr>
+              </a:contourClr>
+            </a:sp3d>
+          </a:bodyPr>
+          <a:lstStyle/>
+          <a:p>
+            <a:pPr algn="ctr"/>
+            <a:r>
+              <a:rPr lang="fr-FR" sz="3500" b="1" dirty="0" smtClean="0">
+                <a:ln w="11430"/>
+                <a:gradFill>
+                  <a:gsLst>
+                    <a:gs pos="0">
+                      <a:schemeClr val="accent6">
+                        <a:tint val="90000"/>
+                        <a:satMod val="120000"/>
+                      </a:schemeClr>
+                    </a:gs>
+                    <a:gs pos="25000">
+                      <a:schemeClr val="accent6">
+                        <a:tint val="93000"/>
+                        <a:satMod val="120000"/>
+                      </a:schemeClr>
+                    </a:gs>
+                    <a:gs pos="50000">
+                      <a:schemeClr val="accent6">
+                        <a:shade val="89000"/>
+                        <a:satMod val="110000"/>
+                      </a:schemeClr>
+                    </a:gs>
+                    <a:gs pos="75000">
+                      <a:schemeClr val="accent6">
+                        <a:tint val="93000"/>
+                        <a:satMod val="120000"/>
+                      </a:schemeClr>
+                    </a:gs>
+                    <a:gs pos="100000">
+                      <a:schemeClr val="accent6">
+                        <a:tint val="90000"/>
+                        <a:satMod val="120000"/>
+                      </a:schemeClr>
+                    </a:gs>
+                  </a:gsLst>
+                  <a:lin ang="5400000"/>
+                </a:gradFill>
+                <a:effectLst>
+                  <a:outerShdw blurRad="80000" dist="40000" dir="5040000" algn="tl">
+                    <a:srgbClr val="000000">
+                      <a:alpha val="30000"/>
+                    </a:srgbClr>
+                  </a:outerShdw>
+                </a:effectLst>
+                <a:latin typeface="Times New Roman" pitchFamily="18" charset="0"/>
+                <a:cs typeface="Times New Roman" pitchFamily="18" charset="0"/>
+              </a:rPr>
+              <a:t>Différence</a:t>
+            </a:r>
+            <a:r>
+              <a:rPr lang="en-US" sz="3500" b="1" dirty="0" smtClean="0">
+                <a:ln w="11430"/>
+                <a:gradFill>
+                  <a:gsLst>
+                    <a:gs pos="0">
+                      <a:schemeClr val="accent6">
+                        <a:tint val="90000"/>
+                        <a:satMod val="120000"/>
+                      </a:schemeClr>
+                    </a:gs>
+                    <a:gs pos="25000">
+                      <a:schemeClr val="accent6">
+                        <a:tint val="93000"/>
+                        <a:satMod val="120000"/>
+                      </a:schemeClr>
+                    </a:gs>
+                    <a:gs pos="50000">
+                      <a:schemeClr val="accent6">
+                        <a:shade val="89000"/>
+                        <a:satMod val="110000"/>
+                      </a:schemeClr>
+                    </a:gs>
+                    <a:gs pos="75000">
+                      <a:schemeClr val="accent6">
+                        <a:tint val="93000"/>
+                        <a:satMod val="120000"/>
+                      </a:schemeClr>
+                    </a:gs>
+                    <a:gs pos="100000">
+                      <a:schemeClr val="accent6">
+                        <a:tint val="90000"/>
+                        <a:satMod val="120000"/>
+                      </a:schemeClr>
+                    </a:gs>
+                  </a:gsLst>
+                  <a:lin ang="5400000"/>
+                </a:gradFill>
+                <a:effectLst>
+                  <a:outerShdw blurRad="80000" dist="40000" dir="5040000" algn="tl">
+                    <a:srgbClr val="000000">
+                      <a:alpha val="30000"/>
+                    </a:srgbClr>
+                  </a:outerShdw>
+                </a:effectLst>
+                <a:latin typeface="Times New Roman" pitchFamily="18" charset="0"/>
+                <a:cs typeface="Times New Roman" pitchFamily="18" charset="0"/>
+              </a:rPr>
+              <a:t> entre Wildfly et Tomcat</a:t>
             </a:r>
             <a:endParaRPr lang="fr-FR" sz="3500" b="1" dirty="0" smtClean="0">
               <a:ln w="11430"/>
@@ -13271,7 +14890,7 @@
                 <a:latin typeface="Times New Roman" pitchFamily="18" charset="0"/>
                 <a:cs typeface="Times New Roman" pitchFamily="18" charset="0"/>
               </a:rPr>
-              <a:t>Page 7</a:t>
+              <a:t>Page 8</a:t>
             </a:r>
             <a:endParaRPr lang="fr-FR" sz="1400" b="1" dirty="0">
               <a:solidFill>
@@ -13285,18 +14904,155 @@
           </a:p>
         </p:txBody>
       </p:sp>
+      <p:sp>
+        <p:nvSpPr>
+          <p:cNvPr id="16" name="Rectangle 15"/>
+          <p:cNvSpPr/>
+          <p:nvPr/>
+        </p:nvSpPr>
+        <p:spPr>
+          <a:xfrm>
+            <a:off x="714349" y="1412776"/>
+            <a:ext cx="7651678" cy="4524315"/>
+          </a:xfrm>
+          <a:prstGeom prst="rect">
+            <a:avLst/>
+          </a:prstGeom>
+          <a:noFill/>
+        </p:spPr>
+        <p:txBody>
+          <a:bodyPr wrap="square" lIns="91440" tIns="45720" rIns="91440" bIns="45720">
+            <a:spAutoFit/>
+            <a:scene3d>
+              <a:camera prst="orthographicFront"/>
+              <a:lightRig rig="flat" dir="tl">
+                <a:rot lat="0" lon="0" rev="6600000"/>
+              </a:lightRig>
+            </a:scene3d>
+            <a:sp3d extrusionH="25400" contourW="8890">
+              <a:bevelT w="38100" h="31750"/>
+              <a:contourClr>
+                <a:schemeClr val="accent2">
+                  <a:shade val="75000"/>
+                </a:schemeClr>
+              </a:contourClr>
+            </a:sp3d>
+          </a:bodyPr>
+          <a:lstStyle/>
+          <a:p>
+            <a:pPr>
+              <a:lnSpc>
+                <a:spcPct val="200000"/>
+              </a:lnSpc>
+            </a:pPr>
+            <a:r>
+              <a:rPr lang="fr-FR" dirty="0" smtClean="0">
+                <a:solidFill>
+                  <a:schemeClr val="bg1"/>
+                </a:solidFill>
+              </a:rPr>
+              <a:t>Les </a:t>
+            </a:r>
+            <a:r>
+              <a:rPr lang="fr-FR" dirty="0">
+                <a:solidFill>
+                  <a:schemeClr val="bg1"/>
+                </a:solidFill>
+              </a:rPr>
+              <a:t>deux </a:t>
+            </a:r>
+            <a:r>
+              <a:rPr lang="fr-FR" dirty="0" smtClean="0">
+                <a:solidFill>
+                  <a:schemeClr val="bg1"/>
+                </a:solidFill>
+              </a:rPr>
+              <a:t>Wildfly et </a:t>
+            </a:r>
+            <a:r>
+              <a:rPr lang="fr-FR" dirty="0">
+                <a:solidFill>
+                  <a:schemeClr val="bg1"/>
+                </a:solidFill>
+              </a:rPr>
+              <a:t>Tomcat sont des serveurs d'applications de servlet </a:t>
+            </a:r>
+            <a:r>
+              <a:rPr lang="fr-FR" dirty="0" smtClean="0">
+                <a:solidFill>
+                  <a:schemeClr val="bg1"/>
+                </a:solidFill>
+              </a:rPr>
+              <a:t>Java. </a:t>
+            </a:r>
+            <a:r>
+              <a:rPr lang="fr-FR" dirty="0">
+                <a:solidFill>
+                  <a:schemeClr val="bg1"/>
+                </a:solidFill>
+              </a:rPr>
+              <a:t>La différence importante entre les deux est que Wildfly </a:t>
+            </a:r>
+            <a:r>
+              <a:rPr lang="fr-FR" dirty="0" smtClean="0">
+                <a:solidFill>
+                  <a:schemeClr val="bg1"/>
+                </a:solidFill>
+              </a:rPr>
+              <a:t>fournit </a:t>
+            </a:r>
+            <a:r>
+              <a:rPr lang="fr-FR" dirty="0">
+                <a:solidFill>
+                  <a:schemeClr val="bg1"/>
+                </a:solidFill>
+              </a:rPr>
+              <a:t>un Java Enterprise Edition (JEE) pile complète, y compris Enterprise JavaBeans et de nombreuses autres technologies qui sont utiles pour les développeurs travaillant sur des applications Java d'entreprise. Tomcat est beaucoup plus limité. Une façon de penser est que Wildfly </a:t>
+            </a:r>
+            <a:r>
+              <a:rPr lang="fr-FR" dirty="0" smtClean="0">
+                <a:solidFill>
+                  <a:schemeClr val="bg1"/>
+                </a:solidFill>
+              </a:rPr>
+              <a:t>est </a:t>
+            </a:r>
+            <a:r>
+              <a:rPr lang="fr-FR" dirty="0">
+                <a:solidFill>
+                  <a:schemeClr val="bg1"/>
+                </a:solidFill>
+              </a:rPr>
+              <a:t>une pile JEE qui comprend un serveur de conteneur de servlet et web, alors que Tomcat, pour la plupart, est un conteneur de servlet et le serveur web.</a:t>
+            </a:r>
+            <a:endParaRPr lang="fr-FR" b="1" cap="none" spc="0" dirty="0">
+              <a:ln w="11430"/>
+              <a:solidFill>
+                <a:schemeClr val="bg1"/>
+              </a:solidFill>
+              <a:effectLst>
+                <a:outerShdw blurRad="50800" dist="39000" dir="5460000" algn="tl">
+                  <a:srgbClr val="000000">
+                    <a:alpha val="38000"/>
+                  </a:srgbClr>
+                </a:outerShdw>
+              </a:effectLst>
+            </a:endParaRPr>
+          </a:p>
+        </p:txBody>
+      </p:sp>
     </p:spTree>
     <p:extLst>
       <p:ext uri="{BB962C8B-B14F-4D97-AF65-F5344CB8AC3E}">
-        <p14:creationId xmlns:p14="http://schemas.microsoft.com/office/powerpoint/2010/main" val="2654403344"/>
+        <p14:creationId xmlns:p14="http://schemas.microsoft.com/office/powerpoint/2010/main" val="407718454"/>
       </p:ext>
     </p:extLst>
   </p:cSld>
   <p:clrMapOvr>
     <a:masterClrMapping/>
   </p:clrMapOvr>
-  <mc:AlternateContent xmlns:mc="http://schemas.openxmlformats.org/markup-compatibility/2006">
-    <mc:Choice xmlns:p14="http://schemas.microsoft.com/office/powerpoint/2010/main" Requires="p14">
+  <mc:AlternateContent xmlns:mc="http://schemas.openxmlformats.org/markup-compatibility/2006" xmlns:p14="http://schemas.microsoft.com/office/powerpoint/2010/main">
+    <mc:Choice Requires="p14">
       <p:transition spd="med" p14:dur="700">
         <p:fade/>
         <p:sndAc>
@@ -13306,12 +15062,12 @@
         </p:sndAc>
       </p:transition>
     </mc:Choice>
-    <mc:Fallback>
+    <mc:Fallback xmlns="">
       <p:transition spd="med">
         <p:fade/>
         <p:sndAc>
           <p:stSnd>
-            <p:snd r:embed="rId2" name="click.wav"/>
+            <p:snd r:embed="rId6" name="click.wav"/>
           </p:stSnd>
         </p:sndAc>
       </p:transition>
@@ -13327,7 +15083,7 @@
 </p:sld>
 </file>
 
-<file path=ppt/slides/slide8.xml><?xml version="1.0" encoding="utf-8"?>
+<file path=ppt/slides/slide9.xml><?xml version="1.0" encoding="utf-8"?>
 <p:sld xmlns:a="http://schemas.openxmlformats.org/drawingml/2006/main" xmlns:r="http://schemas.openxmlformats.org/officeDocument/2006/relationships" xmlns:p="http://schemas.openxmlformats.org/presentationml/2006/main">
   <p:cSld>
     <p:spTree>
@@ -13825,6 +15581,56 @@
           <a:lstStyle/>
           <a:p>
             <a:pPr algn="ctr"/>
+            <a:r>
+              <a:rPr lang="fr-FR" sz="3500" b="1" dirty="0">
+                <a:ln w="11430"/>
+                <a:gradFill>
+                  <a:gsLst>
+                    <a:gs pos="0">
+                      <a:schemeClr val="accent6">
+                        <a:tint val="90000"/>
+                        <a:satMod val="120000"/>
+                      </a:schemeClr>
+                    </a:gs>
+                    <a:gs pos="25000">
+                      <a:schemeClr val="accent6">
+                        <a:tint val="93000"/>
+                        <a:satMod val="120000"/>
+                      </a:schemeClr>
+                    </a:gs>
+                    <a:gs pos="50000">
+                      <a:schemeClr val="accent6">
+                        <a:shade val="89000"/>
+                        <a:satMod val="110000"/>
+                      </a:schemeClr>
+                    </a:gs>
+                    <a:gs pos="75000">
+                      <a:schemeClr val="accent6">
+                        <a:tint val="93000"/>
+                        <a:satMod val="120000"/>
+                      </a:schemeClr>
+                    </a:gs>
+                    <a:gs pos="100000">
+                      <a:schemeClr val="accent6">
+                        <a:tint val="90000"/>
+                        <a:satMod val="120000"/>
+                      </a:schemeClr>
+                    </a:gs>
+                  </a:gsLst>
+                  <a:lin ang="5400000"/>
+                </a:gradFill>
+                <a:effectLst>
+                  <a:outerShdw blurRad="80000" dist="40000" dir="5040000" algn="tl">
+                    <a:srgbClr val="000000">
+                      <a:alpha val="30000"/>
+                    </a:srgbClr>
+                  </a:outerShdw>
+                </a:effectLst>
+                <a:latin typeface="Times New Roman" pitchFamily="18" charset="0"/>
+                <a:cs typeface="Times New Roman" pitchFamily="18" charset="0"/>
+              </a:rPr>
+              <a:t>Quand choisir </a:t>
+            </a:r>
             <a:r>
               <a:rPr lang="fr-FR" sz="3500" b="1" dirty="0" smtClean="0">
                 <a:ln w="11430"/>
@@ -13873,105 +15679,8 @@
                 <a:latin typeface="Times New Roman" pitchFamily="18" charset="0"/>
                 <a:cs typeface="Times New Roman" pitchFamily="18" charset="0"/>
               </a:rPr>
-              <a:t>Différence</a:t>
-            </a:r>
-            <a:r>
-              <a:rPr lang="en-US" sz="3500" b="1" dirty="0" smtClean="0">
-                <a:ln w="11430"/>
-                <a:gradFill>
-                  <a:gsLst>
-                    <a:gs pos="0">
-                      <a:schemeClr val="accent6">
-                        <a:tint val="90000"/>
-                        <a:satMod val="120000"/>
-                      </a:schemeClr>
-                    </a:gs>
-                    <a:gs pos="25000">
-                      <a:schemeClr val="accent6">
-                        <a:tint val="93000"/>
-                        <a:satMod val="120000"/>
-                      </a:schemeClr>
-                    </a:gs>
-                    <a:gs pos="50000">
-                      <a:schemeClr val="accent6">
-                        <a:shade val="89000"/>
-                        <a:satMod val="110000"/>
-                      </a:schemeClr>
-                    </a:gs>
-                    <a:gs pos="75000">
-                      <a:schemeClr val="accent6">
-                        <a:tint val="93000"/>
-                        <a:satMod val="120000"/>
-                      </a:schemeClr>
-                    </a:gs>
-                    <a:gs pos="100000">
-                      <a:schemeClr val="accent6">
-                        <a:tint val="90000"/>
-                        <a:satMod val="120000"/>
-                      </a:schemeClr>
-                    </a:gs>
-                  </a:gsLst>
-                  <a:lin ang="5400000"/>
-                </a:gradFill>
-                <a:effectLst>
-                  <a:outerShdw blurRad="80000" dist="40000" dir="5040000" algn="tl">
-                    <a:srgbClr val="000000">
-                      <a:alpha val="30000"/>
-                    </a:srgbClr>
-                  </a:outerShdw>
-                </a:effectLst>
-                <a:latin typeface="Times New Roman" pitchFamily="18" charset="0"/>
-                <a:cs typeface="Times New Roman" pitchFamily="18" charset="0"/>
-              </a:rPr>
-              <a:t> entre Wildfly et Tomcat</a:t>
-            </a:r>
-            <a:endParaRPr lang="fr-FR" sz="3500" b="1" dirty="0" smtClean="0">
-              <a:ln w="11430"/>
-              <a:gradFill>
-                <a:gsLst>
-                  <a:gs pos="0">
-                    <a:schemeClr val="accent6">
-                      <a:tint val="90000"/>
-                      <a:satMod val="120000"/>
-                    </a:schemeClr>
-                  </a:gs>
-                  <a:gs pos="25000">
-                    <a:schemeClr val="accent6">
-                      <a:tint val="93000"/>
-                      <a:satMod val="120000"/>
-                    </a:schemeClr>
-                  </a:gs>
-                  <a:gs pos="50000">
-                    <a:schemeClr val="accent6">
-                      <a:shade val="89000"/>
-                      <a:satMod val="110000"/>
-                    </a:schemeClr>
-                  </a:gs>
-                  <a:gs pos="75000">
-                    <a:schemeClr val="accent6">
-                      <a:tint val="93000"/>
-                      <a:satMod val="120000"/>
-                    </a:schemeClr>
-                  </a:gs>
-                  <a:gs pos="100000">
-                    <a:schemeClr val="accent6">
-                      <a:tint val="90000"/>
-                      <a:satMod val="120000"/>
-                    </a:schemeClr>
-                  </a:gs>
-                </a:gsLst>
-                <a:lin ang="5400000"/>
-              </a:gradFill>
-              <a:effectLst>
-                <a:outerShdw blurRad="80000" dist="40000" dir="5040000" algn="tl">
-                  <a:srgbClr val="000000">
-                    <a:alpha val="30000"/>
-                  </a:srgbClr>
-                </a:outerShdw>
-              </a:effectLst>
-              <a:latin typeface="Times New Roman" pitchFamily="18" charset="0"/>
-              <a:cs typeface="Times New Roman" pitchFamily="18" charset="0"/>
-            </a:endParaRPr>
+              <a:t>Wildfly ?</a:t>
+            </a:r>
           </a:p>
         </p:txBody>
       </p:sp>
@@ -14089,7 +15798,7 @@
                 <a:latin typeface="Times New Roman" pitchFamily="18" charset="0"/>
                 <a:cs typeface="Times New Roman" pitchFamily="18" charset="0"/>
               </a:rPr>
-              <a:t>Page 8</a:t>
+              <a:t>Page 9</a:t>
             </a:r>
             <a:endParaRPr lang="fr-FR" sz="1400" b="1" dirty="0">
               <a:solidFill>
@@ -14150,7 +15859,7 @@
                   <a:schemeClr val="bg1"/>
                 </a:solidFill>
               </a:rPr>
-              <a:t>Les </a:t>
+              <a:t>Wildfly est </a:t>
             </a:r>
             <a:r>
               <a:rPr lang="fr-FR" dirty="0">
@@ -14158,7 +15867,7 @@
                   <a:schemeClr val="bg1"/>
                 </a:solidFill>
               </a:rPr>
-              <a:t>deux </a:t>
+              <a:t>le meilleur choix pour les applications où les développeurs ont besoin d'accéder pleinement à la fonctionnalité que le Java Enterprise Edition fournit et sont heureux avec les implémentations </a:t>
             </a:r>
             <a:r>
               <a:rPr lang="fr-FR" dirty="0" smtClean="0">
@@ -14166,7 +15875,7 @@
                   <a:schemeClr val="bg1"/>
                 </a:solidFill>
               </a:rPr>
-              <a:t>Wildfly et </a:t>
+              <a:t>de cette fonctionnalité par défaut  fournie avec elle. </a:t>
             </a:r>
             <a:r>
               <a:rPr lang="fr-FR" dirty="0">
@@ -14174,7 +15883,7 @@
                   <a:schemeClr val="bg1"/>
                 </a:solidFill>
               </a:rPr>
-              <a:t>Tomcat sont des serveurs d'applications de servlet </a:t>
+              <a:t>Si vous n'avez pas besoin de la gamme complète de JEE dispose, puis en </a:t>
             </a:r>
             <a:r>
               <a:rPr lang="fr-FR" dirty="0" smtClean="0">
@@ -14182,7 +15891,7 @@
                   <a:schemeClr val="bg1"/>
                 </a:solidFill>
               </a:rPr>
-              <a:t>Java. </a:t>
+              <a:t>choisissant </a:t>
             </a:r>
             <a:r>
               <a:rPr lang="fr-FR" dirty="0">
@@ -14190,7 +15899,7 @@
                   <a:schemeClr val="bg1"/>
                 </a:solidFill>
               </a:rPr>
-              <a:t>La différence importante entre les deux est que Wildfly </a:t>
+              <a:t>Wildfly </a:t>
             </a:r>
             <a:r>
               <a:rPr lang="fr-FR" dirty="0" smtClean="0">
@@ -14198,7 +15907,7 @@
                   <a:schemeClr val="bg1"/>
                 </a:solidFill>
               </a:rPr>
-              <a:t>fournit </a:t>
+              <a:t>va </a:t>
             </a:r>
             <a:r>
               <a:rPr lang="fr-FR" dirty="0">
@@ -14206,7 +15915,7 @@
                   <a:schemeClr val="bg1"/>
                 </a:solidFill>
               </a:rPr>
-              <a:t>un Java Enterprise Edition (JEE) pile complète, y compris Enterprise JavaBeans et de nombreuses autres technologies qui sont utiles pour les développeurs travaillant sur des applications Java d'entreprise. Tomcat est beaucoup plus limité. Une façon de penser est que Wildfly </a:t>
+              <a:t>ajouter beaucoup de complexité au déploiement et </a:t>
             </a:r>
             <a:r>
               <a:rPr lang="fr-FR" dirty="0" smtClean="0">
@@ -14214,7 +15923,7 @@
                   <a:schemeClr val="bg1"/>
                 </a:solidFill>
               </a:rPr>
-              <a:t>est </a:t>
+              <a:t>aux </a:t>
             </a:r>
             <a:r>
               <a:rPr lang="fr-FR" dirty="0">
@@ -14222,7 +15931,39 @@
                   <a:schemeClr val="bg1"/>
                 </a:solidFill>
               </a:rPr>
-              <a:t>une pile JEE qui comprend un serveur de conteneur de servlet et web, alors que Tomcat, pour la plupart, est un conteneur de servlet et le serveur web.</a:t>
+              <a:t>frais généraux des ressources qui </a:t>
+            </a:r>
+            <a:r>
+              <a:rPr lang="fr-FR" dirty="0" smtClean="0">
+                <a:solidFill>
+                  <a:schemeClr val="bg1"/>
+                </a:solidFill>
+              </a:rPr>
+              <a:t>iront </a:t>
+            </a:r>
+            <a:r>
+              <a:rPr lang="fr-FR" dirty="0">
+                <a:solidFill>
+                  <a:schemeClr val="bg1"/>
+                </a:solidFill>
+              </a:rPr>
+              <a:t>utilisé. Par exemple, les fichiers d'installation Wildfly </a:t>
+            </a:r>
+            <a:r>
+              <a:rPr lang="fr-FR" dirty="0" smtClean="0">
+                <a:solidFill>
+                  <a:schemeClr val="bg1"/>
+                </a:solidFill>
+              </a:rPr>
+              <a:t>sont </a:t>
+            </a:r>
+            <a:r>
+              <a:rPr lang="fr-FR" dirty="0">
+                <a:solidFill>
+                  <a:schemeClr val="bg1"/>
+                </a:solidFill>
+              </a:rPr>
+              <a:t>autour d'un ordre de grandeur plus grand que Tomcat.</a:t>
             </a:r>
             <a:endParaRPr lang="fr-FR" b="1" cap="none" spc="0" dirty="0">
               <a:ln w="11430"/>
@@ -14243,15 +15984,15 @@
     </p:spTree>
     <p:extLst>
       <p:ext uri="{BB962C8B-B14F-4D97-AF65-F5344CB8AC3E}">
-        <p14:creationId xmlns:p14="http://schemas.microsoft.com/office/powerpoint/2010/main" val="407718454"/>
+        <p14:creationId xmlns:p14="http://schemas.microsoft.com/office/powerpoint/2010/main" val="3343768925"/>
       </p:ext>
     </p:extLst>
   </p:cSld>
   <p:clrMapOvr>
     <a:masterClrMapping/>
   </p:clrMapOvr>
-  <mc:AlternateContent xmlns:mc="http://schemas.openxmlformats.org/markup-compatibility/2006">
-    <mc:Choice xmlns:p14="http://schemas.microsoft.com/office/powerpoint/2010/main" Requires="p14">
+  <mc:AlternateContent xmlns:mc="http://schemas.openxmlformats.org/markup-compatibility/2006" xmlns:p14="http://schemas.microsoft.com/office/powerpoint/2010/main">
+    <mc:Choice Requires="p14">
       <p:transition spd="med" p14:dur="700">
         <p:fade/>
         <p:sndAc>
@@ -14261,999 +16002,12 @@
         </p:sndAc>
       </p:transition>
     </mc:Choice>
-    <mc:Fallback>
+    <mc:Fallback xmlns="">
       <p:transition spd="med">
         <p:fade/>
         <p:sndAc>
           <p:stSnd>
-            <p:snd r:embed="rId2" name="click.wav"/>
-          </p:stSnd>
-        </p:sndAc>
-      </p:transition>
-    </mc:Fallback>
-  </mc:AlternateContent>
-  <p:timing>
-    <p:tnLst>
-      <p:par>
-        <p:cTn id="1" dur="indefinite" restart="never" nodeType="tmRoot"/>
-      </p:par>
-    </p:tnLst>
-  </p:timing>
-</p:sld>
-</file>
-
-<file path=ppt/slides/slide9.xml><?xml version="1.0" encoding="utf-8"?>
-<p:sld xmlns:a="http://schemas.openxmlformats.org/drawingml/2006/main" xmlns:r="http://schemas.openxmlformats.org/officeDocument/2006/relationships" xmlns:p="http://schemas.openxmlformats.org/presentationml/2006/main">
-  <p:cSld>
-    <p:spTree>
-      <p:nvGrpSpPr>
-        <p:cNvPr id="1" name=""/>
-        <p:cNvGrpSpPr/>
-        <p:nvPr/>
-      </p:nvGrpSpPr>
-      <p:grpSpPr>
-        <a:xfrm>
-          <a:off x="0" y="0"/>
-          <a:ext cx="0" cy="0"/>
-          <a:chOff x="0" y="0"/>
-          <a:chExt cx="0" cy="0"/>
-        </a:xfrm>
-      </p:grpSpPr>
-      <p:sp>
-        <p:nvSpPr>
-          <p:cNvPr id="4" name="Cube 3"/>
-          <p:cNvSpPr/>
-          <p:nvPr/>
-        </p:nvSpPr>
-        <p:spPr>
-          <a:xfrm flipH="1">
-            <a:off x="71406" y="142852"/>
-            <a:ext cx="714380" cy="779324"/>
-          </a:xfrm>
-          <a:prstGeom prst="cube">
-            <a:avLst/>
-          </a:prstGeom>
-          <a:gradFill flip="none" rotWithShape="1">
-            <a:gsLst>
-              <a:gs pos="0">
-                <a:srgbClr val="FFFFFF"/>
-              </a:gs>
-              <a:gs pos="7001">
-                <a:srgbClr val="E6E6E6"/>
-              </a:gs>
-              <a:gs pos="32001">
-                <a:srgbClr val="7D8496"/>
-              </a:gs>
-              <a:gs pos="47000">
-                <a:srgbClr val="E6E6E6"/>
-              </a:gs>
-              <a:gs pos="85001">
-                <a:srgbClr val="7D8496"/>
-              </a:gs>
-              <a:gs pos="100000">
-                <a:srgbClr val="E6E6E6"/>
-              </a:gs>
-            </a:gsLst>
-            <a:lin ang="13500000" scaled="0"/>
-            <a:tileRect/>
-          </a:gradFill>
-          <a:effectLst>
-            <a:outerShdw blurRad="76200" dist="12700" dir="2700000" sy="-23000" kx="-800400" algn="bl" rotWithShape="0">
-              <a:prstClr val="black">
-                <a:alpha val="20000"/>
-              </a:prstClr>
-            </a:outerShdw>
-          </a:effectLst>
-          <a:scene3d>
-            <a:camera prst="isometricOffAxis1Right"/>
-            <a:lightRig rig="threePt" dir="t"/>
-          </a:scene3d>
-        </p:spPr>
-        <p:style>
-          <a:lnRef idx="1">
-            <a:schemeClr val="accent6"/>
-          </a:lnRef>
-          <a:fillRef idx="2">
-            <a:schemeClr val="accent6"/>
-          </a:fillRef>
-          <a:effectRef idx="1">
-            <a:schemeClr val="accent6"/>
-          </a:effectRef>
-          <a:fontRef idx="minor">
-            <a:schemeClr val="dk1"/>
-          </a:fontRef>
-        </p:style>
-        <p:txBody>
-          <a:bodyPr rtlCol="0" anchor="ctr"/>
-          <a:lstStyle/>
-          <a:p>
-            <a:pPr algn="ctr"/>
-            <a:endParaRPr lang="fr-FR" dirty="0"/>
-          </a:p>
-        </p:txBody>
-      </p:sp>
-      <p:sp>
-        <p:nvSpPr>
-          <p:cNvPr id="5" name="Cube 4"/>
-          <p:cNvSpPr/>
-          <p:nvPr/>
-        </p:nvSpPr>
-        <p:spPr>
-          <a:xfrm flipH="1">
-            <a:off x="714348" y="357166"/>
-            <a:ext cx="642942" cy="714380"/>
-          </a:xfrm>
-          <a:prstGeom prst="cube">
-            <a:avLst/>
-          </a:prstGeom>
-          <a:gradFill flip="none" rotWithShape="1">
-            <a:gsLst>
-              <a:gs pos="0">
-                <a:srgbClr val="FFFFFF"/>
-              </a:gs>
-              <a:gs pos="7001">
-                <a:srgbClr val="E6E6E6"/>
-              </a:gs>
-              <a:gs pos="32001">
-                <a:srgbClr val="7D8496"/>
-              </a:gs>
-              <a:gs pos="47000">
-                <a:srgbClr val="E6E6E6"/>
-              </a:gs>
-              <a:gs pos="85001">
-                <a:srgbClr val="7D8496"/>
-              </a:gs>
-              <a:gs pos="100000">
-                <a:srgbClr val="E6E6E6"/>
-              </a:gs>
-            </a:gsLst>
-            <a:lin ang="13500000" scaled="0"/>
-            <a:tileRect/>
-          </a:gradFill>
-          <a:effectLst>
-            <a:outerShdw blurRad="76200" dist="12700" dir="2700000" sy="-23000" kx="-800400" algn="bl" rotWithShape="0">
-              <a:prstClr val="black">
-                <a:alpha val="20000"/>
-              </a:prstClr>
-            </a:outerShdw>
-          </a:effectLst>
-          <a:scene3d>
-            <a:camera prst="isometricOffAxis1Right"/>
-            <a:lightRig rig="threePt" dir="t"/>
-          </a:scene3d>
-        </p:spPr>
-        <p:style>
-          <a:lnRef idx="1">
-            <a:schemeClr val="accent6"/>
-          </a:lnRef>
-          <a:fillRef idx="2">
-            <a:schemeClr val="accent6"/>
-          </a:fillRef>
-          <a:effectRef idx="1">
-            <a:schemeClr val="accent6"/>
-          </a:effectRef>
-          <a:fontRef idx="minor">
-            <a:schemeClr val="dk1"/>
-          </a:fontRef>
-        </p:style>
-        <p:txBody>
-          <a:bodyPr rtlCol="0" anchor="ctr"/>
-          <a:lstStyle/>
-          <a:p>
-            <a:pPr algn="ctr"/>
-            <a:endParaRPr lang="fr-FR" dirty="0"/>
-          </a:p>
-        </p:txBody>
-      </p:sp>
-      <p:pic>
-        <p:nvPicPr>
-          <p:cNvPr id="6" name="Picture 5" descr="ISAE.png"/>
-          <p:cNvPicPr>
-            <a:picLocks noChangeAspect="1"/>
-          </p:cNvPicPr>
-          <p:nvPr/>
-        </p:nvPicPr>
-        <p:blipFill>
-          <a:blip r:embed="rId3"/>
-          <a:stretch>
-            <a:fillRect/>
-          </a:stretch>
-        </p:blipFill>
-        <p:spPr>
-          <a:xfrm>
-            <a:off x="967628" y="571480"/>
-            <a:ext cx="389662" cy="389662"/>
-          </a:xfrm>
-          <a:prstGeom prst="roundRect">
-            <a:avLst>
-              <a:gd name="adj" fmla="val 16667"/>
-            </a:avLst>
-          </a:prstGeom>
-          <a:ln>
-            <a:noFill/>
-          </a:ln>
-          <a:effectLst>
-            <a:outerShdw blurRad="76200" dir="18900000" sy="23000" kx="-1200000" algn="bl" rotWithShape="0">
-              <a:prstClr val="black">
-                <a:alpha val="20000"/>
-              </a:prstClr>
-            </a:outerShdw>
-          </a:effectLst>
-          <a:scene3d>
-            <a:camera prst="isometricOffAxis1Right"/>
-            <a:lightRig rig="threePt" dir="t"/>
-          </a:scene3d>
-          <a:sp3d contourW="6350" prstMaterial="matte">
-            <a:bevelT w="101600" h="101600"/>
-            <a:contourClr>
-              <a:srgbClr val="969696"/>
-            </a:contourClr>
-          </a:sp3d>
-        </p:spPr>
-      </p:pic>
-      <p:sp>
-        <p:nvSpPr>
-          <p:cNvPr id="7" name="Half Frame 6"/>
-          <p:cNvSpPr/>
-          <p:nvPr/>
-        </p:nvSpPr>
-        <p:spPr>
-          <a:xfrm rot="10800000" flipV="1">
-            <a:off x="857224" y="142852"/>
-            <a:ext cx="8001056" cy="428628"/>
-          </a:xfrm>
-          <a:prstGeom prst="halfFrame">
-            <a:avLst/>
-          </a:prstGeom>
-          <a:gradFill>
-            <a:gsLst>
-              <a:gs pos="0">
-                <a:srgbClr val="FFFFFF"/>
-              </a:gs>
-              <a:gs pos="7001">
-                <a:srgbClr val="E6E6E6"/>
-              </a:gs>
-              <a:gs pos="32001">
-                <a:srgbClr val="7D8496"/>
-              </a:gs>
-              <a:gs pos="47000">
-                <a:srgbClr val="E6E6E6"/>
-              </a:gs>
-              <a:gs pos="85001">
-                <a:srgbClr val="7D8496"/>
-              </a:gs>
-              <a:gs pos="100000">
-                <a:srgbClr val="E6E6E6"/>
-              </a:gs>
-            </a:gsLst>
-            <a:lin ang="13500000" scaled="0"/>
-          </a:gradFill>
-          <a:ln w="15875">
-            <a:solidFill>
-              <a:schemeClr val="bg1">
-                <a:lumMod val="75000"/>
-                <a:lumOff val="25000"/>
-              </a:schemeClr>
-            </a:solidFill>
-          </a:ln>
-        </p:spPr>
-        <p:style>
-          <a:lnRef idx="2">
-            <a:schemeClr val="accent1">
-              <a:shade val="50000"/>
-            </a:schemeClr>
-          </a:lnRef>
-          <a:fillRef idx="1">
-            <a:schemeClr val="accent1"/>
-          </a:fillRef>
-          <a:effectRef idx="0">
-            <a:schemeClr val="accent1"/>
-          </a:effectRef>
-          <a:fontRef idx="minor">
-            <a:schemeClr val="lt1"/>
-          </a:fontRef>
-        </p:style>
-        <p:txBody>
-          <a:bodyPr rtlCol="0" anchor="ctr"/>
-          <a:lstStyle/>
-          <a:p>
-            <a:pPr algn="ctr"/>
-            <a:endParaRPr lang="fr-FR" dirty="0">
-              <a:solidFill>
-                <a:schemeClr val="tx1"/>
-              </a:solidFill>
-            </a:endParaRPr>
-          </a:p>
-        </p:txBody>
-      </p:sp>
-      <p:sp>
-        <p:nvSpPr>
-          <p:cNvPr id="8" name="Half Frame 7"/>
-          <p:cNvSpPr/>
-          <p:nvPr/>
-        </p:nvSpPr>
-        <p:spPr>
-          <a:xfrm rot="10800000" flipH="1">
-            <a:off x="142844" y="6357958"/>
-            <a:ext cx="8715436" cy="357190"/>
-          </a:xfrm>
-          <a:prstGeom prst="halfFrame">
-            <a:avLst/>
-          </a:prstGeom>
-          <a:gradFill>
-            <a:gsLst>
-              <a:gs pos="0">
-                <a:srgbClr val="FFFFFF"/>
-              </a:gs>
-              <a:gs pos="7001">
-                <a:srgbClr val="E6E6E6"/>
-              </a:gs>
-              <a:gs pos="32001">
-                <a:srgbClr val="7D8496"/>
-              </a:gs>
-              <a:gs pos="47000">
-                <a:srgbClr val="E6E6E6"/>
-              </a:gs>
-              <a:gs pos="85001">
-                <a:srgbClr val="7D8496"/>
-              </a:gs>
-              <a:gs pos="100000">
-                <a:srgbClr val="E6E6E6"/>
-              </a:gs>
-            </a:gsLst>
-            <a:lin ang="13500000" scaled="0"/>
-          </a:gradFill>
-          <a:ln w="15875">
-            <a:solidFill>
-              <a:schemeClr val="bg1">
-                <a:lumMod val="75000"/>
-                <a:lumOff val="25000"/>
-              </a:schemeClr>
-            </a:solidFill>
-          </a:ln>
-        </p:spPr>
-        <p:style>
-          <a:lnRef idx="2">
-            <a:schemeClr val="accent1">
-              <a:shade val="50000"/>
-            </a:schemeClr>
-          </a:lnRef>
-          <a:fillRef idx="1">
-            <a:schemeClr val="accent1"/>
-          </a:fillRef>
-          <a:effectRef idx="0">
-            <a:schemeClr val="accent1"/>
-          </a:effectRef>
-          <a:fontRef idx="minor">
-            <a:schemeClr val="lt1"/>
-          </a:fontRef>
-        </p:style>
-        <p:txBody>
-          <a:bodyPr rtlCol="0" anchor="ctr"/>
-          <a:lstStyle/>
-          <a:p>
-            <a:pPr algn="ctr"/>
-            <a:endParaRPr lang="fr-FR" dirty="0">
-              <a:solidFill>
-                <a:schemeClr val="tx1"/>
-              </a:solidFill>
-            </a:endParaRPr>
-          </a:p>
-        </p:txBody>
-      </p:sp>
-      <p:sp>
-        <p:nvSpPr>
-          <p:cNvPr id="9" name="Rectangle 8"/>
-          <p:cNvSpPr/>
-          <p:nvPr/>
-        </p:nvSpPr>
-        <p:spPr>
-          <a:xfrm>
-            <a:off x="8715404" y="642918"/>
-            <a:ext cx="142876" cy="5715040"/>
-          </a:xfrm>
-          <a:prstGeom prst="rect">
-            <a:avLst/>
-          </a:prstGeom>
-          <a:solidFill>
-            <a:srgbClr val="B5C0D9"/>
-          </a:solidFill>
-          <a:ln w="15875">
-            <a:solidFill>
-              <a:schemeClr val="bg1">
-                <a:lumMod val="75000"/>
-                <a:lumOff val="25000"/>
-              </a:schemeClr>
-            </a:solidFill>
-          </a:ln>
-        </p:spPr>
-        <p:style>
-          <a:lnRef idx="2">
-            <a:schemeClr val="accent1">
-              <a:shade val="50000"/>
-            </a:schemeClr>
-          </a:lnRef>
-          <a:fillRef idx="1">
-            <a:schemeClr val="accent1"/>
-          </a:fillRef>
-          <a:effectRef idx="0">
-            <a:schemeClr val="accent1"/>
-          </a:effectRef>
-          <a:fontRef idx="minor">
-            <a:schemeClr val="lt1"/>
-          </a:fontRef>
-        </p:style>
-        <p:txBody>
-          <a:bodyPr rtlCol="0" anchor="ctr"/>
-          <a:lstStyle/>
-          <a:p>
-            <a:pPr algn="ctr"/>
-            <a:endParaRPr lang="fr-FR" dirty="0"/>
-          </a:p>
-        </p:txBody>
-      </p:sp>
-      <p:sp>
-        <p:nvSpPr>
-          <p:cNvPr id="10" name="Rectangle 9"/>
-          <p:cNvSpPr/>
-          <p:nvPr/>
-        </p:nvSpPr>
-        <p:spPr>
-          <a:xfrm>
-            <a:off x="142844" y="1214422"/>
-            <a:ext cx="142876" cy="4991136"/>
-          </a:xfrm>
-          <a:prstGeom prst="rect">
-            <a:avLst/>
-          </a:prstGeom>
-          <a:solidFill>
-            <a:srgbClr val="B5C0D9"/>
-          </a:solidFill>
-          <a:ln w="15875">
-            <a:solidFill>
-              <a:schemeClr val="bg1">
-                <a:lumMod val="75000"/>
-                <a:lumOff val="25000"/>
-              </a:schemeClr>
-            </a:solidFill>
-          </a:ln>
-        </p:spPr>
-        <p:style>
-          <a:lnRef idx="2">
-            <a:schemeClr val="accent1">
-              <a:shade val="50000"/>
-            </a:schemeClr>
-          </a:lnRef>
-          <a:fillRef idx="1">
-            <a:schemeClr val="accent1"/>
-          </a:fillRef>
-          <a:effectRef idx="0">
-            <a:schemeClr val="accent1"/>
-          </a:effectRef>
-          <a:fontRef idx="minor">
-            <a:schemeClr val="lt1"/>
-          </a:fontRef>
-        </p:style>
-        <p:txBody>
-          <a:bodyPr rtlCol="0" anchor="ctr"/>
-          <a:lstStyle/>
-          <a:p>
-            <a:pPr algn="ctr"/>
-            <a:endParaRPr lang="fr-FR" dirty="0"/>
-          </a:p>
-        </p:txBody>
-      </p:sp>
-      <p:sp>
-        <p:nvSpPr>
-          <p:cNvPr id="11" name="Rectangle 10"/>
-          <p:cNvSpPr/>
-          <p:nvPr/>
-        </p:nvSpPr>
-        <p:spPr>
-          <a:xfrm>
-            <a:off x="1071538" y="428604"/>
-            <a:ext cx="7929618" cy="630942"/>
-          </a:xfrm>
-          <a:prstGeom prst="rect">
-            <a:avLst/>
-          </a:prstGeom>
-          <a:noFill/>
-        </p:spPr>
-        <p:txBody>
-          <a:bodyPr wrap="square" lIns="91440" tIns="45720" rIns="91440" bIns="45720">
-            <a:spAutoFit/>
-            <a:scene3d>
-              <a:camera prst="orthographicFront"/>
-              <a:lightRig rig="glow" dir="tl">
-                <a:rot lat="0" lon="0" rev="5400000"/>
-              </a:lightRig>
-            </a:scene3d>
-            <a:sp3d contourW="12700">
-              <a:bevelT w="25400" h="25400"/>
-              <a:contourClr>
-                <a:schemeClr val="accent6">
-                  <a:shade val="73000"/>
-                </a:schemeClr>
-              </a:contourClr>
-            </a:sp3d>
-          </a:bodyPr>
-          <a:lstStyle/>
-          <a:p>
-            <a:pPr algn="ctr"/>
-            <a:r>
-              <a:rPr lang="fr-FR" sz="3500" b="1" dirty="0">
-                <a:ln w="11430"/>
-                <a:gradFill>
-                  <a:gsLst>
-                    <a:gs pos="0">
-                      <a:schemeClr val="accent6">
-                        <a:tint val="90000"/>
-                        <a:satMod val="120000"/>
-                      </a:schemeClr>
-                    </a:gs>
-                    <a:gs pos="25000">
-                      <a:schemeClr val="accent6">
-                        <a:tint val="93000"/>
-                        <a:satMod val="120000"/>
-                      </a:schemeClr>
-                    </a:gs>
-                    <a:gs pos="50000">
-                      <a:schemeClr val="accent6">
-                        <a:shade val="89000"/>
-                        <a:satMod val="110000"/>
-                      </a:schemeClr>
-                    </a:gs>
-                    <a:gs pos="75000">
-                      <a:schemeClr val="accent6">
-                        <a:tint val="93000"/>
-                        <a:satMod val="120000"/>
-                      </a:schemeClr>
-                    </a:gs>
-                    <a:gs pos="100000">
-                      <a:schemeClr val="accent6">
-                        <a:tint val="90000"/>
-                        <a:satMod val="120000"/>
-                      </a:schemeClr>
-                    </a:gs>
-                  </a:gsLst>
-                  <a:lin ang="5400000"/>
-                </a:gradFill>
-                <a:effectLst>
-                  <a:outerShdw blurRad="80000" dist="40000" dir="5040000" algn="tl">
-                    <a:srgbClr val="000000">
-                      <a:alpha val="30000"/>
-                    </a:srgbClr>
-                  </a:outerShdw>
-                </a:effectLst>
-                <a:latin typeface="Times New Roman" pitchFamily="18" charset="0"/>
-                <a:cs typeface="Times New Roman" pitchFamily="18" charset="0"/>
-              </a:rPr>
-              <a:t>Quand choisir </a:t>
-            </a:r>
-            <a:r>
-              <a:rPr lang="fr-FR" sz="3500" b="1" dirty="0" smtClean="0">
-                <a:ln w="11430"/>
-                <a:gradFill>
-                  <a:gsLst>
-                    <a:gs pos="0">
-                      <a:schemeClr val="accent6">
-                        <a:tint val="90000"/>
-                        <a:satMod val="120000"/>
-                      </a:schemeClr>
-                    </a:gs>
-                    <a:gs pos="25000">
-                      <a:schemeClr val="accent6">
-                        <a:tint val="93000"/>
-                        <a:satMod val="120000"/>
-                      </a:schemeClr>
-                    </a:gs>
-                    <a:gs pos="50000">
-                      <a:schemeClr val="accent6">
-                        <a:shade val="89000"/>
-                        <a:satMod val="110000"/>
-                      </a:schemeClr>
-                    </a:gs>
-                    <a:gs pos="75000">
-                      <a:schemeClr val="accent6">
-                        <a:tint val="93000"/>
-                        <a:satMod val="120000"/>
-                      </a:schemeClr>
-                    </a:gs>
-                    <a:gs pos="100000">
-                      <a:schemeClr val="accent6">
-                        <a:tint val="90000"/>
-                        <a:satMod val="120000"/>
-                      </a:schemeClr>
-                    </a:gs>
-                  </a:gsLst>
-                  <a:lin ang="5400000"/>
-                </a:gradFill>
-                <a:effectLst>
-                  <a:outerShdw blurRad="80000" dist="40000" dir="5040000" algn="tl">
-                    <a:srgbClr val="000000">
-                      <a:alpha val="30000"/>
-                    </a:srgbClr>
-                  </a:outerShdw>
-                </a:effectLst>
-                <a:latin typeface="Times New Roman" pitchFamily="18" charset="0"/>
-                <a:cs typeface="Times New Roman" pitchFamily="18" charset="0"/>
-              </a:rPr>
-              <a:t>Wildfly ?</a:t>
-            </a:r>
-            <a:endParaRPr lang="fr-FR" sz="3500" b="1" dirty="0" smtClean="0">
-              <a:ln w="11430"/>
-              <a:gradFill>
-                <a:gsLst>
-                  <a:gs pos="0">
-                    <a:schemeClr val="accent6">
-                      <a:tint val="90000"/>
-                      <a:satMod val="120000"/>
-                    </a:schemeClr>
-                  </a:gs>
-                  <a:gs pos="25000">
-                    <a:schemeClr val="accent6">
-                      <a:tint val="93000"/>
-                      <a:satMod val="120000"/>
-                    </a:schemeClr>
-                  </a:gs>
-                  <a:gs pos="50000">
-                    <a:schemeClr val="accent6">
-                      <a:shade val="89000"/>
-                      <a:satMod val="110000"/>
-                    </a:schemeClr>
-                  </a:gs>
-                  <a:gs pos="75000">
-                    <a:schemeClr val="accent6">
-                      <a:tint val="93000"/>
-                      <a:satMod val="120000"/>
-                    </a:schemeClr>
-                  </a:gs>
-                  <a:gs pos="100000">
-                    <a:schemeClr val="accent6">
-                      <a:tint val="90000"/>
-                      <a:satMod val="120000"/>
-                    </a:schemeClr>
-                  </a:gs>
-                </a:gsLst>
-                <a:lin ang="5400000"/>
-              </a:gradFill>
-              <a:effectLst>
-                <a:outerShdw blurRad="80000" dist="40000" dir="5040000" algn="tl">
-                  <a:srgbClr val="000000">
-                    <a:alpha val="30000"/>
-                  </a:srgbClr>
-                </a:outerShdw>
-              </a:effectLst>
-              <a:latin typeface="Times New Roman" pitchFamily="18" charset="0"/>
-              <a:cs typeface="Times New Roman" pitchFamily="18" charset="0"/>
-            </a:endParaRPr>
-          </a:p>
-        </p:txBody>
-      </p:sp>
-      <p:pic>
-        <p:nvPicPr>
-          <p:cNvPr id="12" name="Picture 11" descr="C:\Program Files\Microsoft Office\MEDIA\OFFICE11\Lines\BD21338_.gif"/>
-          <p:cNvPicPr/>
-          <p:nvPr/>
-        </p:nvPicPr>
-        <p:blipFill>
-          <a:blip r:embed="rId4"/>
-          <a:srcRect/>
-          <a:stretch>
-            <a:fillRect/>
-          </a:stretch>
-        </p:blipFill>
-        <p:spPr bwMode="auto">
-          <a:xfrm>
-            <a:off x="1428728" y="1142984"/>
-            <a:ext cx="7286676" cy="71438"/>
-          </a:xfrm>
-          <a:prstGeom prst="rect">
-            <a:avLst/>
-          </a:prstGeom>
-          <a:ln>
-            <a:noFill/>
-          </a:ln>
-          <a:effectLst>
-            <a:outerShdw blurRad="292100" dist="139700" dir="2700000" algn="tl" rotWithShape="0">
-              <a:srgbClr val="333333">
-                <a:alpha val="65000"/>
-              </a:srgbClr>
-            </a:outerShdw>
-          </a:effectLst>
-        </p:spPr>
-      </p:pic>
-      <p:pic>
-        <p:nvPicPr>
-          <p:cNvPr id="13" name="Picture 12" descr="cnam.png"/>
-          <p:cNvPicPr>
-            <a:picLocks noChangeAspect="1"/>
-          </p:cNvPicPr>
-          <p:nvPr/>
-        </p:nvPicPr>
-        <p:blipFill>
-          <a:blip r:embed="rId5"/>
-          <a:stretch>
-            <a:fillRect/>
-          </a:stretch>
-        </p:blipFill>
-        <p:spPr>
-          <a:xfrm>
-            <a:off x="357158" y="428604"/>
-            <a:ext cx="428628" cy="428628"/>
-          </a:xfrm>
-          <a:prstGeom prst="roundRect">
-            <a:avLst>
-              <a:gd name="adj" fmla="val 16667"/>
-            </a:avLst>
-          </a:prstGeom>
-          <a:ln>
-            <a:noFill/>
-          </a:ln>
-          <a:effectLst>
-            <a:outerShdw blurRad="76200" dist="38100" dir="7800000" algn="tl" rotWithShape="0">
-              <a:srgbClr val="000000">
-                <a:alpha val="40000"/>
-              </a:srgbClr>
-            </a:outerShdw>
-          </a:effectLst>
-          <a:scene3d>
-            <a:camera prst="isometricOffAxis1Right"/>
-            <a:lightRig rig="contrasting" dir="t">
-              <a:rot lat="0" lon="0" rev="4200000"/>
-            </a:lightRig>
-          </a:scene3d>
-          <a:sp3d prstMaterial="plastic">
-            <a:bevelT w="381000" h="114300" prst="relaxedInset"/>
-            <a:contourClr>
-              <a:srgbClr val="969696"/>
-            </a:contourClr>
-          </a:sp3d>
-        </p:spPr>
-      </p:pic>
-      <p:sp>
-        <p:nvSpPr>
-          <p:cNvPr id="14" name="TextBox 13"/>
-          <p:cNvSpPr txBox="1"/>
-          <p:nvPr/>
-        </p:nvSpPr>
-        <p:spPr>
-          <a:xfrm>
-            <a:off x="7524328" y="6357958"/>
-            <a:ext cx="1476828" cy="307777"/>
-          </a:xfrm>
-          <a:prstGeom prst="rect">
-            <a:avLst/>
-          </a:prstGeom>
-          <a:noFill/>
-        </p:spPr>
-        <p:txBody>
-          <a:bodyPr wrap="square" rtlCol="0">
-            <a:spAutoFit/>
-          </a:bodyPr>
-          <a:lstStyle/>
-          <a:p>
-            <a:pPr algn="ctr"/>
-            <a:r>
-              <a:rPr lang="fr-FR" sz="1400" b="1" dirty="0" smtClean="0">
-                <a:solidFill>
-                  <a:schemeClr val="accent5">
-                    <a:lumMod val="50000"/>
-                  </a:schemeClr>
-                </a:solidFill>
-                <a:latin typeface="Times New Roman" pitchFamily="18" charset="0"/>
-                <a:cs typeface="Times New Roman" pitchFamily="18" charset="0"/>
-              </a:rPr>
-              <a:t>Page 9</a:t>
-            </a:r>
-            <a:endParaRPr lang="fr-FR" sz="1400" b="1" dirty="0">
-              <a:solidFill>
-                <a:schemeClr val="accent5">
-                  <a:lumMod val="50000"/>
-                </a:schemeClr>
-              </a:solidFill>
-              <a:latin typeface="Times New Roman" pitchFamily="18" charset="0"/>
-              <a:cs typeface="Times New Roman" pitchFamily="18" charset="0"/>
-            </a:endParaRPr>
-          </a:p>
-        </p:txBody>
-      </p:sp>
-      <p:sp>
-        <p:nvSpPr>
-          <p:cNvPr id="16" name="Rectangle 15"/>
-          <p:cNvSpPr/>
-          <p:nvPr/>
-        </p:nvSpPr>
-        <p:spPr>
-          <a:xfrm>
-            <a:off x="714349" y="1412776"/>
-            <a:ext cx="7651678" cy="4524315"/>
-          </a:xfrm>
-          <a:prstGeom prst="rect">
-            <a:avLst/>
-          </a:prstGeom>
-          <a:noFill/>
-        </p:spPr>
-        <p:txBody>
-          <a:bodyPr wrap="square" lIns="91440" tIns="45720" rIns="91440" bIns="45720">
-            <a:spAutoFit/>
-            <a:scene3d>
-              <a:camera prst="orthographicFront"/>
-              <a:lightRig rig="flat" dir="tl">
-                <a:rot lat="0" lon="0" rev="6600000"/>
-              </a:lightRig>
-            </a:scene3d>
-            <a:sp3d extrusionH="25400" contourW="8890">
-              <a:bevelT w="38100" h="31750"/>
-              <a:contourClr>
-                <a:schemeClr val="accent2">
-                  <a:shade val="75000"/>
-                </a:schemeClr>
-              </a:contourClr>
-            </a:sp3d>
-          </a:bodyPr>
-          <a:lstStyle/>
-          <a:p>
-            <a:pPr>
-              <a:lnSpc>
-                <a:spcPct val="200000"/>
-              </a:lnSpc>
-            </a:pPr>
-            <a:r>
-              <a:rPr lang="fr-FR" dirty="0" smtClean="0">
-                <a:solidFill>
-                  <a:schemeClr val="bg1"/>
-                </a:solidFill>
-              </a:rPr>
-              <a:t>Wildfly est </a:t>
-            </a:r>
-            <a:r>
-              <a:rPr lang="fr-FR" dirty="0">
-                <a:solidFill>
-                  <a:schemeClr val="bg1"/>
-                </a:solidFill>
-              </a:rPr>
-              <a:t>le meilleur choix pour les applications où les développeurs ont besoin d'accéder pleinement à la fonctionnalité que le Java Enterprise Edition fournit et sont heureux avec les implémentations </a:t>
-            </a:r>
-            <a:r>
-              <a:rPr lang="fr-FR" dirty="0" smtClean="0">
-                <a:solidFill>
-                  <a:schemeClr val="bg1"/>
-                </a:solidFill>
-              </a:rPr>
-              <a:t>de cette fonctionnalité par défaut  fournie avec elle. </a:t>
-            </a:r>
-            <a:r>
-              <a:rPr lang="fr-FR" dirty="0">
-                <a:solidFill>
-                  <a:schemeClr val="bg1"/>
-                </a:solidFill>
-              </a:rPr>
-              <a:t>Si vous n'avez pas besoin de la gamme complète de JEE dispose, puis en </a:t>
-            </a:r>
-            <a:r>
-              <a:rPr lang="fr-FR" dirty="0" smtClean="0">
-                <a:solidFill>
-                  <a:schemeClr val="bg1"/>
-                </a:solidFill>
-              </a:rPr>
-              <a:t>choisissant </a:t>
-            </a:r>
-            <a:r>
-              <a:rPr lang="fr-FR" dirty="0">
-                <a:solidFill>
-                  <a:schemeClr val="bg1"/>
-                </a:solidFill>
-              </a:rPr>
-              <a:t>Wildfly </a:t>
-            </a:r>
-            <a:r>
-              <a:rPr lang="fr-FR" dirty="0" smtClean="0">
-                <a:solidFill>
-                  <a:schemeClr val="bg1"/>
-                </a:solidFill>
-              </a:rPr>
-              <a:t>va </a:t>
-            </a:r>
-            <a:r>
-              <a:rPr lang="fr-FR" dirty="0">
-                <a:solidFill>
-                  <a:schemeClr val="bg1"/>
-                </a:solidFill>
-              </a:rPr>
-              <a:t>ajouter beaucoup de complexité au déploiement et </a:t>
-            </a:r>
-            <a:r>
-              <a:rPr lang="fr-FR" dirty="0" smtClean="0">
-                <a:solidFill>
-                  <a:schemeClr val="bg1"/>
-                </a:solidFill>
-              </a:rPr>
-              <a:t>aux </a:t>
-            </a:r>
-            <a:r>
-              <a:rPr lang="fr-FR" dirty="0">
-                <a:solidFill>
-                  <a:schemeClr val="bg1"/>
-                </a:solidFill>
-              </a:rPr>
-              <a:t>frais généraux des ressources qui </a:t>
-            </a:r>
-            <a:r>
-              <a:rPr lang="fr-FR" dirty="0" smtClean="0">
-                <a:solidFill>
-                  <a:schemeClr val="bg1"/>
-                </a:solidFill>
-              </a:rPr>
-              <a:t>iront </a:t>
-            </a:r>
-            <a:r>
-              <a:rPr lang="fr-FR" dirty="0">
-                <a:solidFill>
-                  <a:schemeClr val="bg1"/>
-                </a:solidFill>
-              </a:rPr>
-              <a:t>utilisé. Par exemple, les fichiers d'installation Wildfly </a:t>
-            </a:r>
-            <a:r>
-              <a:rPr lang="fr-FR" dirty="0" smtClean="0">
-                <a:solidFill>
-                  <a:schemeClr val="bg1"/>
-                </a:solidFill>
-              </a:rPr>
-              <a:t>sont </a:t>
-            </a:r>
-            <a:r>
-              <a:rPr lang="fr-FR" dirty="0">
-                <a:solidFill>
-                  <a:schemeClr val="bg1"/>
-                </a:solidFill>
-              </a:rPr>
-              <a:t>autour d'un ordre de grandeur plus grand que Tomcat.</a:t>
-            </a:r>
-            <a:endParaRPr lang="fr-FR" b="1" cap="none" spc="0" dirty="0">
-              <a:ln w="11430"/>
-              <a:solidFill>
-                <a:schemeClr val="bg1"/>
-              </a:solidFill>
-              <a:effectLst>
-                <a:outerShdw blurRad="50800" dist="39000" dir="5460000" algn="tl">
-                  <a:srgbClr val="000000">
-                    <a:alpha val="38000"/>
-                  </a:srgbClr>
-                </a:outerShdw>
-              </a:effectLst>
-            </a:endParaRPr>
-          </a:p>
-        </p:txBody>
-      </p:sp>
-    </p:spTree>
-    <p:extLst>
-      <p:ext uri="{BB962C8B-B14F-4D97-AF65-F5344CB8AC3E}">
-        <p14:creationId xmlns:p14="http://schemas.microsoft.com/office/powerpoint/2010/main" val="3343768925"/>
-      </p:ext>
-    </p:extLst>
-  </p:cSld>
-  <p:clrMapOvr>
-    <a:masterClrMapping/>
-  </p:clrMapOvr>
-  <mc:AlternateContent xmlns:mc="http://schemas.openxmlformats.org/markup-compatibility/2006">
-    <mc:Choice xmlns:p14="http://schemas.microsoft.com/office/powerpoint/2010/main" Requires="p14">
-      <p:transition spd="med" p14:dur="700">
-        <p:fade/>
-        <p:sndAc>
-          <p:stSnd>
-            <p:snd r:embed="rId2" name="click.wav"/>
-          </p:stSnd>
-        </p:sndAc>
-      </p:transition>
-    </mc:Choice>
-    <mc:Fallback>
-      <p:transition spd="med">
-        <p:fade/>
-        <p:sndAc>
-          <p:stSnd>
-            <p:snd r:embed="rId2" name="click.wav"/>
+            <p:snd r:embed="rId6" name="click.wav"/>
           </p:stSnd>
         </p:sndAc>
       </p:transition>

</xml_diff>

<commit_message>
Presentation wildfly derniere version
</commit_message>
<xml_diff>
--- a/Presentation wildfly.pptx
+++ b/Presentation wildfly.pptx
@@ -213,7 +213,7 @@
             <a:fld id="{BBD50C84-7995-4141-8C80-BD0923B98C87}" type="datetimeFigureOut">
               <a:rPr lang="fr-FR" smtClean="0"/>
               <a:pPr/>
-              <a:t>27/03/2016</a:t>
+              <a:t>28/03/2016</a:t>
             </a:fld>
             <a:endParaRPr lang="fr-FR" dirty="0"/>
           </a:p>
@@ -381,7 +381,7 @@
             <a:fld id="{7EA85DF2-79F7-42E6-887D-8B83702526F6}" type="datetimeFigureOut">
               <a:rPr lang="fr-FR" smtClean="0"/>
               <a:pPr/>
-              <a:t>27/03/2016</a:t>
+              <a:t>28/03/2016</a:t>
             </a:fld>
             <a:endParaRPr lang="fr-FR" dirty="0"/>
           </a:p>
@@ -1026,7 +1026,7 @@
             <a:fld id="{6E94641B-9268-4C67-BC60-6ACCF4A40EFD}" type="datetime1">
               <a:rPr lang="en-US" smtClean="0"/>
               <a:pPr/>
-              <a:t>3/27/2016</a:t>
+              <a:t>3/28/2016</a:t>
             </a:fld>
             <a:endParaRPr lang="en-US" dirty="0"/>
           </a:p>
@@ -1205,7 +1205,7 @@
             <a:fld id="{9977F712-9BA1-4A42-8F59-9ACE0CF2DC8F}" type="datetime1">
               <a:rPr lang="en-US" smtClean="0"/>
               <a:pPr/>
-              <a:t>3/27/2016</a:t>
+              <a:t>3/28/2016</a:t>
             </a:fld>
             <a:endParaRPr lang="en-US" dirty="0"/>
           </a:p>
@@ -1394,7 +1394,7 @@
             <a:fld id="{ABC2A5CA-5217-4786-92B7-034717829193}" type="datetime1">
               <a:rPr lang="en-US" smtClean="0"/>
               <a:pPr/>
-              <a:t>3/27/2016</a:t>
+              <a:t>3/28/2016</a:t>
             </a:fld>
             <a:endParaRPr lang="en-US" dirty="0"/>
           </a:p>
@@ -1555,7 +1555,7 @@
             <a:fld id="{F365AC28-58B8-49ED-99F8-BB0379B19E78}" type="datetime1">
               <a:rPr lang="en-US" smtClean="0"/>
               <a:pPr/>
-              <a:t>3/27/2016</a:t>
+              <a:t>3/28/2016</a:t>
             </a:fld>
             <a:endParaRPr lang="en-US" dirty="0"/>
           </a:p>
@@ -1686,7 +1686,7 @@
             <a:fld id="{D092ED61-0808-414B-941E-4426C51EFA23}" type="datetime1">
               <a:rPr lang="en-US" smtClean="0"/>
               <a:pPr/>
-              <a:t>3/27/2016</a:t>
+              <a:t>3/28/2016</a:t>
             </a:fld>
             <a:endParaRPr lang="en-US" dirty="0"/>
           </a:p>
@@ -1970,7 +1970,7 @@
             <a:fld id="{797C5EBF-8ACD-4559-9325-DABF09FD913B}" type="datetime1">
               <a:rPr lang="en-US" smtClean="0"/>
               <a:pPr/>
-              <a:t>3/27/2016</a:t>
+              <a:t>3/28/2016</a:t>
             </a:fld>
             <a:endParaRPr lang="en-US" dirty="0"/>
           </a:p>
@@ -2258,7 +2258,7 @@
             <a:fld id="{C307A0FA-BA80-41EF-9AC7-12790775F3A7}" type="datetime1">
               <a:rPr lang="en-US" smtClean="0"/>
               <a:pPr/>
-              <a:t>3/27/2016</a:t>
+              <a:t>3/28/2016</a:t>
             </a:fld>
             <a:endParaRPr lang="en-US" dirty="0"/>
           </a:p>
@@ -2714,7 +2714,7 @@
             <a:fld id="{E988777C-CB92-449D-ADD4-881A946C0AD1}" type="datetime1">
               <a:rPr lang="en-US" smtClean="0"/>
               <a:pPr/>
-              <a:t>3/27/2016</a:t>
+              <a:t>3/28/2016</a:t>
             </a:fld>
             <a:endParaRPr lang="en-US" dirty="0"/>
           </a:p>
@@ -2841,7 +2841,7 @@
             <a:fld id="{3FDC07EF-EEC8-4972-AC77-B2FAA32E2150}" type="datetime1">
               <a:rPr lang="en-US" smtClean="0"/>
               <a:pPr/>
-              <a:t>3/27/2016</a:t>
+              <a:t>3/28/2016</a:t>
             </a:fld>
             <a:endParaRPr lang="en-US" dirty="0"/>
           </a:p>
@@ -3105,7 +3105,7 @@
             <a:fld id="{7D64D922-8548-43B4-AEE4-DE7450BFCD21}" type="datetime1">
               <a:rPr lang="en-US" smtClean="0"/>
               <a:pPr/>
-              <a:t>3/27/2016</a:t>
+              <a:t>3/28/2016</a:t>
             </a:fld>
             <a:endParaRPr lang="en-US" dirty="0"/>
           </a:p>
@@ -3359,7 +3359,7 @@
             <a:fld id="{220AF8C6-63B7-4ABC-A607-521C9C34676D}" type="datetime1">
               <a:rPr lang="en-US" smtClean="0"/>
               <a:pPr/>
-              <a:t>3/27/2016</a:t>
+              <a:t>3/28/2016</a:t>
             </a:fld>
             <a:endParaRPr lang="en-US" dirty="0"/>
           </a:p>
@@ -3552,7 +3552,7 @@
             <a:fld id="{E69AEE0B-8BB9-462B-8958-2209086EAC34}" type="datetime1">
               <a:rPr lang="en-US" smtClean="0"/>
               <a:pPr/>
-              <a:t>3/27/2016</a:t>
+              <a:t>3/28/2016</a:t>
             </a:fld>
             <a:endParaRPr lang="en-US" dirty="0">
               <a:solidFill>
@@ -7577,19 +7577,7 @@
                 <a:latin typeface="Times New Roman" pitchFamily="18" charset="0"/>
                 <a:cs typeface="Times New Roman" pitchFamily="18" charset="0"/>
               </a:rPr>
-              <a:t>Page </a:t>
-            </a:r>
-            <a:r>
-              <a:rPr lang="fr-FR" sz="1400" b="1" dirty="0" smtClean="0">
-                <a:solidFill>
-                  <a:schemeClr val="accent5">
-                    <a:lumMod val="50000"/>
-                  </a:schemeClr>
-                </a:solidFill>
-                <a:latin typeface="Times New Roman" pitchFamily="18" charset="0"/>
-                <a:cs typeface="Times New Roman" pitchFamily="18" charset="0"/>
-              </a:rPr>
-              <a:t>12</a:t>
+              <a:t>Page 12</a:t>
             </a:r>
             <a:endParaRPr lang="fr-FR" sz="1400" b="1" dirty="0">
               <a:solidFill>
@@ -8569,12 +8557,12 @@
               <a:t> </a:t>
             </a:r>
             <a:r>
-              <a:rPr lang="fr-FR" sz="2000" dirty="0">
+              <a:rPr lang="fr-FR" sz="2000" dirty="0" smtClean="0">
                 <a:solidFill>
                   <a:schemeClr val="bg1"/>
                 </a:solidFill>
               </a:rPr>
-              <a:t>un petit </a:t>
+              <a:t>Deux petites </a:t>
             </a:r>
             <a:r>
               <a:rPr lang="fr-FR" sz="2000" dirty="0" smtClean="0">

</xml_diff>